<commit_message>
Finished Pintos Project 1.1 Alarm.
</commit_message>
<xml_diff>
--- a/Course/OSConcepts/LABReference/Pintos实验参考结果.pptx
+++ b/Course/OSConcepts/LABReference/Pintos实验参考结果.pptx
@@ -147,7 +147,52 @@
       </a:defRPr>
     </a:lvl9pPr>
   </p:defaultTextStyle>
+  <p:extLst>
+    <p:ext uri="{EFAFB233-063F-42B5-8137-9DF3F51BA10A}">
+      <p15:sldGuideLst xmlns:p15="http://schemas.microsoft.com/office/powerpoint/2012/main">
+        <p15:guide id="1" orient="horz" pos="2160">
+          <p15:clr>
+            <a:srgbClr val="A4A3A4"/>
+          </p15:clr>
+        </p15:guide>
+        <p15:guide id="2" pos="3840">
+          <p15:clr>
+            <a:srgbClr val="A4A3A4"/>
+          </p15:clr>
+        </p15:guide>
+      </p15:sldGuideLst>
+    </p:ext>
+  </p:extLst>
 </p:presentation>
+</file>
+
+<file path=ppt/changesInfos/changesInfo1.xml><?xml version="1.0" encoding="utf-8"?>
+<pc:chgInfo xmlns:a="http://schemas.openxmlformats.org/drawingml/2006/main" xmlns:r="http://schemas.openxmlformats.org/officeDocument/2006/relationships" xmlns:ac="http://schemas.microsoft.com/office/drawing/2013/main/command" xmlns:pc="http://schemas.microsoft.com/office/powerpoint/2013/main/command">
+  <pc:docChgLst>
+    <pc:chgData name="Chen Bill" userId="6f4cfa7ede799baa" providerId="LiveId" clId="{C6FC5563-451D-8447-BFC4-A2A2C415A221}"/>
+    <pc:docChg chg="modSld">
+      <pc:chgData name="Chen Bill" userId="6f4cfa7ede799baa" providerId="LiveId" clId="{C6FC5563-451D-8447-BFC4-A2A2C415A221}" dt="2019-12-18T17:41:40.853" v="0" actId="1076"/>
+      <pc:docMkLst>
+        <pc:docMk/>
+      </pc:docMkLst>
+      <pc:sldChg chg="modSp">
+        <pc:chgData name="Chen Bill" userId="6f4cfa7ede799baa" providerId="LiveId" clId="{C6FC5563-451D-8447-BFC4-A2A2C415A221}" dt="2019-12-18T17:41:40.853" v="0" actId="1076"/>
+        <pc:sldMkLst>
+          <pc:docMk/>
+          <pc:sldMk cId="0" sldId="259"/>
+        </pc:sldMkLst>
+        <pc:picChg chg="mod">
+          <ac:chgData name="Chen Bill" userId="6f4cfa7ede799baa" providerId="LiveId" clId="{C6FC5563-451D-8447-BFC4-A2A2C415A221}" dt="2019-12-18T17:41:40.853" v="0" actId="1076"/>
+          <ac:picMkLst>
+            <pc:docMk/>
+            <pc:sldMk cId="0" sldId="259"/>
+            <ac:picMk id="29699" creationId="{00000000-0000-0000-0000-000000000000}"/>
+          </ac:picMkLst>
+        </pc:picChg>
+      </pc:sldChg>
+    </pc:docChg>
+  </pc:docChgLst>
+</pc:chgInfo>
 </file>
 
 <file path=ppt/notesMasters/notesMaster1.xml><?xml version="1.0" encoding="utf-8"?>
@@ -259,7 +304,7 @@
               <a:pPr>
                 <a:defRPr/>
               </a:pPr>
-              <a:t>2019/10/23</a:t>
+              <a:t>2019/12/19</a:t>
             </a:fld>
             <a:endParaRPr lang="zh-CN" altLang="en-US"/>
           </a:p>
@@ -324,38 +369,37 @@
           <a:p>
             <a:pPr lvl="0"/>
             <a:r>
-              <a:rPr lang="zh-CN" altLang="en-US" noProof="0" smtClean="0"/>
+              <a:rPr lang="zh-CN" altLang="en-US" noProof="0"/>
               <a:t>单击此处编辑母版文本样式</a:t>
             </a:r>
           </a:p>
           <a:p>
             <a:pPr lvl="1"/>
             <a:r>
-              <a:rPr lang="zh-CN" altLang="en-US" noProof="0" smtClean="0"/>
+              <a:rPr lang="zh-CN" altLang="en-US" noProof="0"/>
               <a:t>第二级</a:t>
             </a:r>
           </a:p>
           <a:p>
             <a:pPr lvl="2"/>
             <a:r>
-              <a:rPr lang="zh-CN" altLang="en-US" noProof="0" smtClean="0"/>
+              <a:rPr lang="zh-CN" altLang="en-US" noProof="0"/>
               <a:t>第三级</a:t>
             </a:r>
           </a:p>
           <a:p>
             <a:pPr lvl="3"/>
             <a:r>
-              <a:rPr lang="zh-CN" altLang="en-US" noProof="0" smtClean="0"/>
+              <a:rPr lang="zh-CN" altLang="en-US" noProof="0"/>
               <a:t>第四级</a:t>
             </a:r>
           </a:p>
           <a:p>
             <a:pPr lvl="4"/>
             <a:r>
-              <a:rPr lang="zh-CN" altLang="en-US" noProof="0" smtClean="0"/>
+              <a:rPr lang="zh-CN" altLang="en-US" noProof="0"/>
               <a:t>第五级</a:t>
             </a:r>
-            <a:endParaRPr lang="zh-CN" altLang="en-US" noProof="0"/>
           </a:p>
         </p:txBody>
       </p:sp>
@@ -645,7 +689,7 @@
                 <a:spcPct val="0"/>
               </a:spcBef>
             </a:pPr>
-            <a:endParaRPr lang="zh-CN" altLang="en-US" smtClean="0"/>
+            <a:endParaRPr lang="zh-CN" altLang="en-US"/>
           </a:p>
         </p:txBody>
       </p:sp>
@@ -954,10 +998,10 @@
           <a:p>
             <a:pPr lvl="0"/>
             <a:r>
-              <a:rPr lang="zh-CN" altLang="en-US" noProof="0" smtClean="0"/>
+              <a:rPr lang="zh-CN" altLang="en-US" noProof="0"/>
               <a:t>单击此处编辑母版标题样式</a:t>
             </a:r>
-            <a:endParaRPr lang="en-US" altLang="zh-CN" noProof="0" smtClean="0"/>
+            <a:endParaRPr lang="en-US" altLang="zh-CN" noProof="0"/>
           </a:p>
         </p:txBody>
       </p:sp>
@@ -993,10 +1037,10 @@
           <a:p>
             <a:pPr lvl="0"/>
             <a:r>
-              <a:rPr lang="zh-CN" altLang="en-US" noProof="0" smtClean="0"/>
+              <a:rPr lang="zh-CN" altLang="en-US" noProof="0"/>
               <a:t>单击此处编辑母版副标题样式</a:t>
             </a:r>
-            <a:endParaRPr lang="en-US" altLang="zh-CN" noProof="0" smtClean="0"/>
+            <a:endParaRPr lang="en-US" altLang="zh-CN" noProof="0"/>
           </a:p>
         </p:txBody>
       </p:sp>
@@ -1035,7 +1079,7 @@
               <a:pPr>
                 <a:defRPr/>
               </a:pPr>
-              <a:t>2019/10/23</a:t>
+              <a:t>2019/12/19</a:t>
             </a:fld>
             <a:endParaRPr lang="zh-CN" altLang="en-US"/>
           </a:p>
@@ -1157,10 +1201,9 @@
           <a:lstStyle/>
           <a:p>
             <a:r>
-              <a:rPr lang="zh-CN" altLang="en-US" smtClean="0"/>
+              <a:rPr lang="zh-CN" altLang="en-US"/>
               <a:t>单击此处编辑母版标题样式</a:t>
             </a:r>
-            <a:endParaRPr lang="zh-CN" altLang="en-US"/>
           </a:p>
         </p:txBody>
       </p:sp>
@@ -1181,38 +1224,37 @@
           <a:p>
             <a:pPr lvl="0"/>
             <a:r>
-              <a:rPr lang="zh-CN" altLang="en-US" smtClean="0"/>
+              <a:rPr lang="zh-CN" altLang="en-US"/>
               <a:t>单击此处编辑母版文本样式</a:t>
             </a:r>
           </a:p>
           <a:p>
             <a:pPr lvl="1"/>
             <a:r>
-              <a:rPr lang="zh-CN" altLang="en-US" smtClean="0"/>
+              <a:rPr lang="zh-CN" altLang="en-US"/>
               <a:t>第二级</a:t>
             </a:r>
           </a:p>
           <a:p>
             <a:pPr lvl="2"/>
             <a:r>
-              <a:rPr lang="zh-CN" altLang="en-US" smtClean="0"/>
+              <a:rPr lang="zh-CN" altLang="en-US"/>
               <a:t>第三级</a:t>
             </a:r>
           </a:p>
           <a:p>
             <a:pPr lvl="3"/>
             <a:r>
-              <a:rPr lang="zh-CN" altLang="en-US" smtClean="0"/>
+              <a:rPr lang="zh-CN" altLang="en-US"/>
               <a:t>第四级</a:t>
             </a:r>
           </a:p>
           <a:p>
             <a:pPr lvl="4"/>
             <a:r>
-              <a:rPr lang="zh-CN" altLang="en-US" smtClean="0"/>
+              <a:rPr lang="zh-CN" altLang="en-US"/>
               <a:t>第五级</a:t>
             </a:r>
-            <a:endParaRPr lang="zh-CN" altLang="en-US"/>
           </a:p>
         </p:txBody>
       </p:sp>
@@ -1245,7 +1287,7 @@
               <a:pPr>
                 <a:defRPr/>
               </a:pPr>
-              <a:t>2019/10/23</a:t>
+              <a:t>2019/12/19</a:t>
             </a:fld>
             <a:endParaRPr lang="zh-CN" altLang="en-US"/>
           </a:p>
@@ -1360,10 +1402,9 @@
           <a:lstStyle/>
           <a:p>
             <a:r>
-              <a:rPr lang="zh-CN" altLang="en-US" smtClean="0"/>
+              <a:rPr lang="zh-CN" altLang="en-US"/>
               <a:t>单击此处编辑母版标题样式</a:t>
             </a:r>
-            <a:endParaRPr lang="zh-CN" altLang="en-US"/>
           </a:p>
         </p:txBody>
       </p:sp>
@@ -1389,38 +1430,37 @@
           <a:p>
             <a:pPr lvl="0"/>
             <a:r>
-              <a:rPr lang="zh-CN" altLang="en-US" smtClean="0"/>
+              <a:rPr lang="zh-CN" altLang="en-US"/>
               <a:t>单击此处编辑母版文本样式</a:t>
             </a:r>
           </a:p>
           <a:p>
             <a:pPr lvl="1"/>
             <a:r>
-              <a:rPr lang="zh-CN" altLang="en-US" smtClean="0"/>
+              <a:rPr lang="zh-CN" altLang="en-US"/>
               <a:t>第二级</a:t>
             </a:r>
           </a:p>
           <a:p>
             <a:pPr lvl="2"/>
             <a:r>
-              <a:rPr lang="zh-CN" altLang="en-US" smtClean="0"/>
+              <a:rPr lang="zh-CN" altLang="en-US"/>
               <a:t>第三级</a:t>
             </a:r>
           </a:p>
           <a:p>
             <a:pPr lvl="3"/>
             <a:r>
-              <a:rPr lang="zh-CN" altLang="en-US" smtClean="0"/>
+              <a:rPr lang="zh-CN" altLang="en-US"/>
               <a:t>第四级</a:t>
             </a:r>
           </a:p>
           <a:p>
             <a:pPr lvl="4"/>
             <a:r>
-              <a:rPr lang="zh-CN" altLang="en-US" smtClean="0"/>
+              <a:rPr lang="zh-CN" altLang="en-US"/>
               <a:t>第五级</a:t>
             </a:r>
-            <a:endParaRPr lang="zh-CN" altLang="en-US"/>
           </a:p>
         </p:txBody>
       </p:sp>
@@ -1453,7 +1493,7 @@
               <a:pPr>
                 <a:defRPr/>
               </a:pPr>
-              <a:t>2019/10/23</a:t>
+              <a:t>2019/12/19</a:t>
             </a:fld>
             <a:endParaRPr lang="zh-CN" altLang="en-US"/>
           </a:p>
@@ -1572,10 +1612,9 @@
           </a:lstStyle>
           <a:p>
             <a:r>
-              <a:rPr lang="zh-CN" altLang="en-US" smtClean="0"/>
+              <a:rPr lang="zh-CN" altLang="en-US"/>
               <a:t>单击此处编辑母版标题样式</a:t>
             </a:r>
-            <a:endParaRPr lang="zh-CN" altLang="en-US"/>
           </a:p>
         </p:txBody>
       </p:sp>
@@ -1637,10 +1676,9 @@
           </a:lstStyle>
           <a:p>
             <a:r>
-              <a:rPr lang="zh-CN" altLang="en-US" smtClean="0"/>
+              <a:rPr lang="zh-CN" altLang="en-US"/>
               <a:t>单击此处编辑母版副标题样式</a:t>
             </a:r>
-            <a:endParaRPr lang="zh-CN" altLang="en-US"/>
           </a:p>
         </p:txBody>
       </p:sp>
@@ -1673,7 +1711,7 @@
               <a:pPr>
                 <a:defRPr/>
               </a:pPr>
-              <a:t>2019/10/23</a:t>
+              <a:t>2019/12/19</a:t>
             </a:fld>
             <a:endParaRPr lang="en-US" altLang="zh-CN"/>
           </a:p>
@@ -1786,10 +1824,9 @@
           <a:lstStyle/>
           <a:p>
             <a:r>
-              <a:rPr lang="zh-CN" altLang="en-US" smtClean="0"/>
+              <a:rPr lang="zh-CN" altLang="en-US"/>
               <a:t>单击此处编辑母版标题样式</a:t>
             </a:r>
-            <a:endParaRPr lang="zh-CN" altLang="en-US"/>
           </a:p>
         </p:txBody>
       </p:sp>
@@ -1810,38 +1847,37 @@
           <a:p>
             <a:pPr lvl="0"/>
             <a:r>
-              <a:rPr lang="zh-CN" altLang="en-US" smtClean="0"/>
+              <a:rPr lang="zh-CN" altLang="en-US"/>
               <a:t>单击此处编辑母版文本样式</a:t>
             </a:r>
           </a:p>
           <a:p>
             <a:pPr lvl="1"/>
             <a:r>
-              <a:rPr lang="zh-CN" altLang="en-US" smtClean="0"/>
+              <a:rPr lang="zh-CN" altLang="en-US"/>
               <a:t>第二级</a:t>
             </a:r>
           </a:p>
           <a:p>
             <a:pPr lvl="2"/>
             <a:r>
-              <a:rPr lang="zh-CN" altLang="en-US" smtClean="0"/>
+              <a:rPr lang="zh-CN" altLang="en-US"/>
               <a:t>第三级</a:t>
             </a:r>
           </a:p>
           <a:p>
             <a:pPr lvl="3"/>
             <a:r>
-              <a:rPr lang="zh-CN" altLang="en-US" smtClean="0"/>
+              <a:rPr lang="zh-CN" altLang="en-US"/>
               <a:t>第四级</a:t>
             </a:r>
           </a:p>
           <a:p>
             <a:pPr lvl="4"/>
             <a:r>
-              <a:rPr lang="zh-CN" altLang="en-US" smtClean="0"/>
+              <a:rPr lang="zh-CN" altLang="en-US"/>
               <a:t>第五级</a:t>
             </a:r>
-            <a:endParaRPr lang="zh-CN" altLang="en-US"/>
           </a:p>
         </p:txBody>
       </p:sp>
@@ -1874,7 +1910,7 @@
               <a:pPr>
                 <a:defRPr/>
               </a:pPr>
-              <a:t>2019/10/23</a:t>
+              <a:t>2019/12/19</a:t>
             </a:fld>
             <a:endParaRPr lang="en-US" altLang="zh-CN"/>
           </a:p>
@@ -1996,10 +2032,9 @@
           </a:lstStyle>
           <a:p>
             <a:r>
-              <a:rPr lang="zh-CN" altLang="en-US" smtClean="0"/>
+              <a:rPr lang="zh-CN" altLang="en-US"/>
               <a:t>单击此处编辑母版标题样式</a:t>
             </a:r>
-            <a:endParaRPr lang="zh-CN" altLang="en-US"/>
           </a:p>
         </p:txBody>
       </p:sp>
@@ -2062,7 +2097,7 @@
           <a:p>
             <a:pPr lvl="0"/>
             <a:r>
-              <a:rPr lang="zh-CN" altLang="en-US" smtClean="0"/>
+              <a:rPr lang="zh-CN" altLang="en-US"/>
               <a:t>单击此处编辑母版文本样式</a:t>
             </a:r>
           </a:p>
@@ -2097,7 +2132,7 @@
               <a:pPr>
                 <a:defRPr/>
               </a:pPr>
-              <a:t>2019/10/23</a:t>
+              <a:t>2019/12/19</a:t>
             </a:fld>
             <a:endParaRPr lang="en-US" altLang="zh-CN"/>
           </a:p>
@@ -2210,10 +2245,9 @@
           <a:lstStyle/>
           <a:p>
             <a:r>
-              <a:rPr lang="zh-CN" altLang="en-US" smtClean="0"/>
+              <a:rPr lang="zh-CN" altLang="en-US"/>
               <a:t>单击此处编辑母版标题样式</a:t>
             </a:r>
-            <a:endParaRPr lang="zh-CN" altLang="en-US"/>
           </a:p>
         </p:txBody>
       </p:sp>
@@ -2239,38 +2273,37 @@
           <a:p>
             <a:pPr lvl="0"/>
             <a:r>
-              <a:rPr lang="zh-CN" altLang="en-US" smtClean="0"/>
+              <a:rPr lang="zh-CN" altLang="en-US"/>
               <a:t>单击此处编辑母版文本样式</a:t>
             </a:r>
           </a:p>
           <a:p>
             <a:pPr lvl="1"/>
             <a:r>
-              <a:rPr lang="zh-CN" altLang="en-US" smtClean="0"/>
+              <a:rPr lang="zh-CN" altLang="en-US"/>
               <a:t>第二级</a:t>
             </a:r>
           </a:p>
           <a:p>
             <a:pPr lvl="2"/>
             <a:r>
-              <a:rPr lang="zh-CN" altLang="en-US" smtClean="0"/>
+              <a:rPr lang="zh-CN" altLang="en-US"/>
               <a:t>第三级</a:t>
             </a:r>
           </a:p>
           <a:p>
             <a:pPr lvl="3"/>
             <a:r>
-              <a:rPr lang="zh-CN" altLang="en-US" smtClean="0"/>
+              <a:rPr lang="zh-CN" altLang="en-US"/>
               <a:t>第四级</a:t>
             </a:r>
           </a:p>
           <a:p>
             <a:pPr lvl="4"/>
             <a:r>
-              <a:rPr lang="zh-CN" altLang="en-US" smtClean="0"/>
+              <a:rPr lang="zh-CN" altLang="en-US"/>
               <a:t>第五级</a:t>
             </a:r>
-            <a:endParaRPr lang="zh-CN" altLang="en-US"/>
           </a:p>
         </p:txBody>
       </p:sp>
@@ -2296,38 +2329,37 @@
           <a:p>
             <a:pPr lvl="0"/>
             <a:r>
-              <a:rPr lang="zh-CN" altLang="en-US" smtClean="0"/>
+              <a:rPr lang="zh-CN" altLang="en-US"/>
               <a:t>单击此处编辑母版文本样式</a:t>
             </a:r>
           </a:p>
           <a:p>
             <a:pPr lvl="1"/>
             <a:r>
-              <a:rPr lang="zh-CN" altLang="en-US" smtClean="0"/>
+              <a:rPr lang="zh-CN" altLang="en-US"/>
               <a:t>第二级</a:t>
             </a:r>
           </a:p>
           <a:p>
             <a:pPr lvl="2"/>
             <a:r>
-              <a:rPr lang="zh-CN" altLang="en-US" smtClean="0"/>
+              <a:rPr lang="zh-CN" altLang="en-US"/>
               <a:t>第三级</a:t>
             </a:r>
           </a:p>
           <a:p>
             <a:pPr lvl="3"/>
             <a:r>
-              <a:rPr lang="zh-CN" altLang="en-US" smtClean="0"/>
+              <a:rPr lang="zh-CN" altLang="en-US"/>
               <a:t>第四级</a:t>
             </a:r>
           </a:p>
           <a:p>
             <a:pPr lvl="4"/>
             <a:r>
-              <a:rPr lang="zh-CN" altLang="en-US" smtClean="0"/>
+              <a:rPr lang="zh-CN" altLang="en-US"/>
               <a:t>第五级</a:t>
             </a:r>
-            <a:endParaRPr lang="zh-CN" altLang="en-US"/>
           </a:p>
         </p:txBody>
       </p:sp>
@@ -2360,7 +2392,7 @@
               <a:pPr>
                 <a:defRPr/>
               </a:pPr>
-              <a:t>2019/10/23</a:t>
+              <a:t>2019/12/19</a:t>
             </a:fld>
             <a:endParaRPr lang="en-US" altLang="zh-CN"/>
           </a:p>
@@ -2478,10 +2510,9 @@
           <a:lstStyle/>
           <a:p>
             <a:r>
-              <a:rPr lang="zh-CN" altLang="en-US" smtClean="0"/>
+              <a:rPr lang="zh-CN" altLang="en-US"/>
               <a:t>单击此处编辑母版标题样式</a:t>
             </a:r>
-            <a:endParaRPr lang="zh-CN" altLang="en-US"/>
           </a:p>
         </p:txBody>
       </p:sp>
@@ -2544,7 +2575,7 @@
           <a:p>
             <a:pPr lvl="0"/>
             <a:r>
-              <a:rPr lang="zh-CN" altLang="en-US" smtClean="0"/>
+              <a:rPr lang="zh-CN" altLang="en-US"/>
               <a:t>单击此处编辑母版文本样式</a:t>
             </a:r>
           </a:p>
@@ -2572,38 +2603,37 @@
           <a:p>
             <a:pPr lvl="0"/>
             <a:r>
-              <a:rPr lang="zh-CN" altLang="en-US" smtClean="0"/>
+              <a:rPr lang="zh-CN" altLang="en-US"/>
               <a:t>单击此处编辑母版文本样式</a:t>
             </a:r>
           </a:p>
           <a:p>
             <a:pPr lvl="1"/>
             <a:r>
-              <a:rPr lang="zh-CN" altLang="en-US" smtClean="0"/>
+              <a:rPr lang="zh-CN" altLang="en-US"/>
               <a:t>第二级</a:t>
             </a:r>
           </a:p>
           <a:p>
             <a:pPr lvl="2"/>
             <a:r>
-              <a:rPr lang="zh-CN" altLang="en-US" smtClean="0"/>
+              <a:rPr lang="zh-CN" altLang="en-US"/>
               <a:t>第三级</a:t>
             </a:r>
           </a:p>
           <a:p>
             <a:pPr lvl="3"/>
             <a:r>
-              <a:rPr lang="zh-CN" altLang="en-US" smtClean="0"/>
+              <a:rPr lang="zh-CN" altLang="en-US"/>
               <a:t>第四级</a:t>
             </a:r>
           </a:p>
           <a:p>
             <a:pPr lvl="4"/>
             <a:r>
-              <a:rPr lang="zh-CN" altLang="en-US" smtClean="0"/>
+              <a:rPr lang="zh-CN" altLang="en-US"/>
               <a:t>第五级</a:t>
             </a:r>
-            <a:endParaRPr lang="zh-CN" altLang="en-US"/>
           </a:p>
         </p:txBody>
       </p:sp>
@@ -2666,7 +2696,7 @@
           <a:p>
             <a:pPr lvl="0"/>
             <a:r>
-              <a:rPr lang="zh-CN" altLang="en-US" smtClean="0"/>
+              <a:rPr lang="zh-CN" altLang="en-US"/>
               <a:t>单击此处编辑母版文本样式</a:t>
             </a:r>
           </a:p>
@@ -2694,38 +2724,37 @@
           <a:p>
             <a:pPr lvl="0"/>
             <a:r>
-              <a:rPr lang="zh-CN" altLang="en-US" smtClean="0"/>
+              <a:rPr lang="zh-CN" altLang="en-US"/>
               <a:t>单击此处编辑母版文本样式</a:t>
             </a:r>
           </a:p>
           <a:p>
             <a:pPr lvl="1"/>
             <a:r>
-              <a:rPr lang="zh-CN" altLang="en-US" smtClean="0"/>
+              <a:rPr lang="zh-CN" altLang="en-US"/>
               <a:t>第二级</a:t>
             </a:r>
           </a:p>
           <a:p>
             <a:pPr lvl="2"/>
             <a:r>
-              <a:rPr lang="zh-CN" altLang="en-US" smtClean="0"/>
+              <a:rPr lang="zh-CN" altLang="en-US"/>
               <a:t>第三级</a:t>
             </a:r>
           </a:p>
           <a:p>
             <a:pPr lvl="3"/>
             <a:r>
-              <a:rPr lang="zh-CN" altLang="en-US" smtClean="0"/>
+              <a:rPr lang="zh-CN" altLang="en-US"/>
               <a:t>第四级</a:t>
             </a:r>
           </a:p>
           <a:p>
             <a:pPr lvl="4"/>
             <a:r>
-              <a:rPr lang="zh-CN" altLang="en-US" smtClean="0"/>
+              <a:rPr lang="zh-CN" altLang="en-US"/>
               <a:t>第五级</a:t>
             </a:r>
-            <a:endParaRPr lang="zh-CN" altLang="en-US"/>
           </a:p>
         </p:txBody>
       </p:sp>
@@ -2758,7 +2787,7 @@
               <a:pPr>
                 <a:defRPr/>
               </a:pPr>
-              <a:t>2019/10/23</a:t>
+              <a:t>2019/12/19</a:t>
             </a:fld>
             <a:endParaRPr lang="en-US" altLang="zh-CN"/>
           </a:p>
@@ -2871,10 +2900,9 @@
           <a:lstStyle/>
           <a:p>
             <a:r>
-              <a:rPr lang="zh-CN" altLang="en-US" smtClean="0"/>
+              <a:rPr lang="zh-CN" altLang="en-US"/>
               <a:t>单击此处编辑母版标题样式</a:t>
             </a:r>
-            <a:endParaRPr lang="zh-CN" altLang="en-US"/>
           </a:p>
         </p:txBody>
       </p:sp>
@@ -2907,7 +2935,7 @@
               <a:pPr>
                 <a:defRPr/>
               </a:pPr>
-              <a:t>2019/10/23</a:t>
+              <a:t>2019/12/19</a:t>
             </a:fld>
             <a:endParaRPr lang="en-US" altLang="zh-CN"/>
           </a:p>
@@ -3033,7 +3061,7 @@
               <a:pPr>
                 <a:defRPr/>
               </a:pPr>
-              <a:t>2019/10/23</a:t>
+              <a:t>2019/12/19</a:t>
             </a:fld>
             <a:endParaRPr lang="en-US" altLang="zh-CN"/>
           </a:p>
@@ -3155,10 +3183,9 @@
           </a:lstStyle>
           <a:p>
             <a:r>
-              <a:rPr lang="zh-CN" altLang="en-US" smtClean="0"/>
+              <a:rPr lang="zh-CN" altLang="en-US"/>
               <a:t>单击此处编辑母版标题样式</a:t>
             </a:r>
-            <a:endParaRPr lang="zh-CN" altLang="en-US"/>
           </a:p>
         </p:txBody>
       </p:sp>
@@ -3212,38 +3239,37 @@
           <a:p>
             <a:pPr lvl="0"/>
             <a:r>
-              <a:rPr lang="zh-CN" altLang="en-US" smtClean="0"/>
+              <a:rPr lang="zh-CN" altLang="en-US"/>
               <a:t>单击此处编辑母版文本样式</a:t>
             </a:r>
           </a:p>
           <a:p>
             <a:pPr lvl="1"/>
             <a:r>
-              <a:rPr lang="zh-CN" altLang="en-US" smtClean="0"/>
+              <a:rPr lang="zh-CN" altLang="en-US"/>
               <a:t>第二级</a:t>
             </a:r>
           </a:p>
           <a:p>
             <a:pPr lvl="2"/>
             <a:r>
-              <a:rPr lang="zh-CN" altLang="en-US" smtClean="0"/>
+              <a:rPr lang="zh-CN" altLang="en-US"/>
               <a:t>第三级</a:t>
             </a:r>
           </a:p>
           <a:p>
             <a:pPr lvl="3"/>
             <a:r>
-              <a:rPr lang="zh-CN" altLang="en-US" smtClean="0"/>
+              <a:rPr lang="zh-CN" altLang="en-US"/>
               <a:t>第四级</a:t>
             </a:r>
           </a:p>
           <a:p>
             <a:pPr lvl="4"/>
             <a:r>
-              <a:rPr lang="zh-CN" altLang="en-US" smtClean="0"/>
+              <a:rPr lang="zh-CN" altLang="en-US"/>
               <a:t>第五级</a:t>
             </a:r>
-            <a:endParaRPr lang="zh-CN" altLang="en-US"/>
           </a:p>
         </p:txBody>
       </p:sp>
@@ -3306,7 +3332,7 @@
           <a:p>
             <a:pPr lvl="0"/>
             <a:r>
-              <a:rPr lang="zh-CN" altLang="en-US" smtClean="0"/>
+              <a:rPr lang="zh-CN" altLang="en-US"/>
               <a:t>单击此处编辑母版文本样式</a:t>
             </a:r>
           </a:p>
@@ -3341,7 +3367,7 @@
               <a:pPr>
                 <a:defRPr/>
               </a:pPr>
-              <a:t>2019/10/23</a:t>
+              <a:t>2019/12/19</a:t>
             </a:fld>
             <a:endParaRPr lang="en-US" altLang="zh-CN"/>
           </a:p>
@@ -3454,10 +3480,9 @@
           <a:lstStyle/>
           <a:p>
             <a:r>
-              <a:rPr lang="zh-CN" altLang="en-US" smtClean="0"/>
+              <a:rPr lang="zh-CN" altLang="en-US"/>
               <a:t>单击此处编辑母版标题样式</a:t>
             </a:r>
-            <a:endParaRPr lang="zh-CN" altLang="en-US"/>
           </a:p>
         </p:txBody>
       </p:sp>
@@ -3478,38 +3503,37 @@
           <a:p>
             <a:pPr lvl="0"/>
             <a:r>
-              <a:rPr lang="zh-CN" altLang="en-US" smtClean="0"/>
+              <a:rPr lang="zh-CN" altLang="en-US"/>
               <a:t>单击此处编辑母版文本样式</a:t>
             </a:r>
           </a:p>
           <a:p>
             <a:pPr lvl="1"/>
             <a:r>
-              <a:rPr lang="zh-CN" altLang="en-US" smtClean="0"/>
+              <a:rPr lang="zh-CN" altLang="en-US"/>
               <a:t>第二级</a:t>
             </a:r>
           </a:p>
           <a:p>
             <a:pPr lvl="2"/>
             <a:r>
-              <a:rPr lang="zh-CN" altLang="en-US" smtClean="0"/>
+              <a:rPr lang="zh-CN" altLang="en-US"/>
               <a:t>第三级</a:t>
             </a:r>
           </a:p>
           <a:p>
             <a:pPr lvl="3"/>
             <a:r>
-              <a:rPr lang="zh-CN" altLang="en-US" smtClean="0"/>
+              <a:rPr lang="zh-CN" altLang="en-US"/>
               <a:t>第四级</a:t>
             </a:r>
           </a:p>
           <a:p>
             <a:pPr lvl="4"/>
             <a:r>
-              <a:rPr lang="zh-CN" altLang="en-US" smtClean="0"/>
+              <a:rPr lang="zh-CN" altLang="en-US"/>
               <a:t>第五级</a:t>
             </a:r>
-            <a:endParaRPr lang="zh-CN" altLang="en-US"/>
           </a:p>
         </p:txBody>
       </p:sp>
@@ -3542,7 +3566,7 @@
               <a:pPr>
                 <a:defRPr/>
               </a:pPr>
-              <a:t>2019/10/23</a:t>
+              <a:t>2019/12/19</a:t>
             </a:fld>
             <a:endParaRPr lang="zh-CN" altLang="en-US"/>
           </a:p>
@@ -3661,10 +3685,9 @@
           </a:lstStyle>
           <a:p>
             <a:r>
-              <a:rPr lang="zh-CN" altLang="en-US" smtClean="0"/>
+              <a:rPr lang="zh-CN" altLang="en-US"/>
               <a:t>单击此处编辑母版标题样式</a:t>
             </a:r>
-            <a:endParaRPr lang="zh-CN" altLang="en-US"/>
           </a:p>
         </p:txBody>
       </p:sp>
@@ -3727,7 +3750,7 @@
           <a:p>
             <a:pPr lvl="0"/>
             <a:r>
-              <a:rPr lang="zh-CN" altLang="en-US" noProof="0" smtClean="0"/>
+              <a:rPr lang="zh-CN" altLang="en-US" noProof="0"/>
               <a:t>单击图标添加图片</a:t>
             </a:r>
           </a:p>
@@ -3792,7 +3815,7 @@
           <a:p>
             <a:pPr lvl="0"/>
             <a:r>
-              <a:rPr lang="zh-CN" altLang="en-US" smtClean="0"/>
+              <a:rPr lang="zh-CN" altLang="en-US"/>
               <a:t>单击此处编辑母版文本样式</a:t>
             </a:r>
           </a:p>
@@ -3827,7 +3850,7 @@
               <a:pPr>
                 <a:defRPr/>
               </a:pPr>
-              <a:t>2019/10/23</a:t>
+              <a:t>2019/12/19</a:t>
             </a:fld>
             <a:endParaRPr lang="en-US" altLang="zh-CN"/>
           </a:p>
@@ -3940,10 +3963,9 @@
           <a:lstStyle/>
           <a:p>
             <a:r>
-              <a:rPr lang="zh-CN" altLang="en-US" smtClean="0"/>
+              <a:rPr lang="zh-CN" altLang="en-US"/>
               <a:t>单击此处编辑母版标题样式</a:t>
             </a:r>
-            <a:endParaRPr lang="zh-CN" altLang="en-US"/>
           </a:p>
         </p:txBody>
       </p:sp>
@@ -3964,38 +3986,37 @@
           <a:p>
             <a:pPr lvl="0"/>
             <a:r>
-              <a:rPr lang="zh-CN" altLang="en-US" smtClean="0"/>
+              <a:rPr lang="zh-CN" altLang="en-US"/>
               <a:t>单击此处编辑母版文本样式</a:t>
             </a:r>
           </a:p>
           <a:p>
             <a:pPr lvl="1"/>
             <a:r>
-              <a:rPr lang="zh-CN" altLang="en-US" smtClean="0"/>
+              <a:rPr lang="zh-CN" altLang="en-US"/>
               <a:t>第二级</a:t>
             </a:r>
           </a:p>
           <a:p>
             <a:pPr lvl="2"/>
             <a:r>
-              <a:rPr lang="zh-CN" altLang="en-US" smtClean="0"/>
+              <a:rPr lang="zh-CN" altLang="en-US"/>
               <a:t>第三级</a:t>
             </a:r>
           </a:p>
           <a:p>
             <a:pPr lvl="3"/>
             <a:r>
-              <a:rPr lang="zh-CN" altLang="en-US" smtClean="0"/>
+              <a:rPr lang="zh-CN" altLang="en-US"/>
               <a:t>第四级</a:t>
             </a:r>
           </a:p>
           <a:p>
             <a:pPr lvl="4"/>
             <a:r>
-              <a:rPr lang="zh-CN" altLang="en-US" smtClean="0"/>
+              <a:rPr lang="zh-CN" altLang="en-US"/>
               <a:t>第五级</a:t>
             </a:r>
-            <a:endParaRPr lang="zh-CN" altLang="en-US"/>
           </a:p>
         </p:txBody>
       </p:sp>
@@ -4028,7 +4049,7 @@
               <a:pPr>
                 <a:defRPr/>
               </a:pPr>
-              <a:t>2019/10/23</a:t>
+              <a:t>2019/12/19</a:t>
             </a:fld>
             <a:endParaRPr lang="en-US" altLang="zh-CN"/>
           </a:p>
@@ -4146,10 +4167,9 @@
           <a:lstStyle/>
           <a:p>
             <a:r>
-              <a:rPr lang="zh-CN" altLang="en-US" smtClean="0"/>
+              <a:rPr lang="zh-CN" altLang="en-US"/>
               <a:t>单击此处编辑母版标题样式</a:t>
             </a:r>
-            <a:endParaRPr lang="zh-CN" altLang="en-US"/>
           </a:p>
         </p:txBody>
       </p:sp>
@@ -4175,38 +4195,37 @@
           <a:p>
             <a:pPr lvl="0"/>
             <a:r>
-              <a:rPr lang="zh-CN" altLang="en-US" smtClean="0"/>
+              <a:rPr lang="zh-CN" altLang="en-US"/>
               <a:t>单击此处编辑母版文本样式</a:t>
             </a:r>
           </a:p>
           <a:p>
             <a:pPr lvl="1"/>
             <a:r>
-              <a:rPr lang="zh-CN" altLang="en-US" smtClean="0"/>
+              <a:rPr lang="zh-CN" altLang="en-US"/>
               <a:t>第二级</a:t>
             </a:r>
           </a:p>
           <a:p>
             <a:pPr lvl="2"/>
             <a:r>
-              <a:rPr lang="zh-CN" altLang="en-US" smtClean="0"/>
+              <a:rPr lang="zh-CN" altLang="en-US"/>
               <a:t>第三级</a:t>
             </a:r>
           </a:p>
           <a:p>
             <a:pPr lvl="3"/>
             <a:r>
-              <a:rPr lang="zh-CN" altLang="en-US" smtClean="0"/>
+              <a:rPr lang="zh-CN" altLang="en-US"/>
               <a:t>第四级</a:t>
             </a:r>
           </a:p>
           <a:p>
             <a:pPr lvl="4"/>
             <a:r>
-              <a:rPr lang="zh-CN" altLang="en-US" smtClean="0"/>
+              <a:rPr lang="zh-CN" altLang="en-US"/>
               <a:t>第五级</a:t>
             </a:r>
-            <a:endParaRPr lang="zh-CN" altLang="en-US"/>
           </a:p>
         </p:txBody>
       </p:sp>
@@ -4239,7 +4258,7 @@
               <a:pPr>
                 <a:defRPr/>
               </a:pPr>
-              <a:t>2019/10/23</a:t>
+              <a:t>2019/12/19</a:t>
             </a:fld>
             <a:endParaRPr lang="en-US" altLang="zh-CN"/>
           </a:p>
@@ -4361,10 +4380,9 @@
           </a:lstStyle>
           <a:p>
             <a:r>
-              <a:rPr lang="zh-CN" altLang="en-US" smtClean="0"/>
+              <a:rPr lang="zh-CN" altLang="en-US"/>
               <a:t>单击此处编辑母版标题样式</a:t>
             </a:r>
-            <a:endParaRPr lang="zh-CN" altLang="en-US"/>
           </a:p>
         </p:txBody>
       </p:sp>
@@ -4427,7 +4445,7 @@
           <a:p>
             <a:pPr lvl="0"/>
             <a:r>
-              <a:rPr lang="zh-CN" altLang="en-US" smtClean="0"/>
+              <a:rPr lang="zh-CN" altLang="en-US"/>
               <a:t>单击此处编辑母版文本样式</a:t>
             </a:r>
           </a:p>
@@ -4462,7 +4480,7 @@
               <a:pPr>
                 <a:defRPr/>
               </a:pPr>
-              <a:t>2019/10/23</a:t>
+              <a:t>2019/12/19</a:t>
             </a:fld>
             <a:endParaRPr lang="zh-CN" altLang="en-US"/>
           </a:p>
@@ -4572,10 +4590,9 @@
           <a:lstStyle/>
           <a:p>
             <a:r>
-              <a:rPr lang="zh-CN" altLang="en-US" smtClean="0"/>
+              <a:rPr lang="zh-CN" altLang="en-US"/>
               <a:t>单击此处编辑母版标题样式</a:t>
             </a:r>
-            <a:endParaRPr lang="zh-CN" altLang="en-US"/>
           </a:p>
         </p:txBody>
       </p:sp>
@@ -4601,38 +4618,37 @@
           <a:p>
             <a:pPr lvl="0"/>
             <a:r>
-              <a:rPr lang="zh-CN" altLang="en-US" smtClean="0"/>
+              <a:rPr lang="zh-CN" altLang="en-US"/>
               <a:t>单击此处编辑母版文本样式</a:t>
             </a:r>
           </a:p>
           <a:p>
             <a:pPr lvl="1"/>
             <a:r>
-              <a:rPr lang="zh-CN" altLang="en-US" smtClean="0"/>
+              <a:rPr lang="zh-CN" altLang="en-US"/>
               <a:t>第二级</a:t>
             </a:r>
           </a:p>
           <a:p>
             <a:pPr lvl="2"/>
             <a:r>
-              <a:rPr lang="zh-CN" altLang="en-US" smtClean="0"/>
+              <a:rPr lang="zh-CN" altLang="en-US"/>
               <a:t>第三级</a:t>
             </a:r>
           </a:p>
           <a:p>
             <a:pPr lvl="3"/>
             <a:r>
-              <a:rPr lang="zh-CN" altLang="en-US" smtClean="0"/>
+              <a:rPr lang="zh-CN" altLang="en-US"/>
               <a:t>第四级</a:t>
             </a:r>
           </a:p>
           <a:p>
             <a:pPr lvl="4"/>
             <a:r>
-              <a:rPr lang="zh-CN" altLang="en-US" smtClean="0"/>
+              <a:rPr lang="zh-CN" altLang="en-US"/>
               <a:t>第五级</a:t>
             </a:r>
-            <a:endParaRPr lang="zh-CN" altLang="en-US"/>
           </a:p>
         </p:txBody>
       </p:sp>
@@ -4658,38 +4674,37 @@
           <a:p>
             <a:pPr lvl="0"/>
             <a:r>
-              <a:rPr lang="zh-CN" altLang="en-US" smtClean="0"/>
+              <a:rPr lang="zh-CN" altLang="en-US"/>
               <a:t>单击此处编辑母版文本样式</a:t>
             </a:r>
           </a:p>
           <a:p>
             <a:pPr lvl="1"/>
             <a:r>
-              <a:rPr lang="zh-CN" altLang="en-US" smtClean="0"/>
+              <a:rPr lang="zh-CN" altLang="en-US"/>
               <a:t>第二级</a:t>
             </a:r>
           </a:p>
           <a:p>
             <a:pPr lvl="2"/>
             <a:r>
-              <a:rPr lang="zh-CN" altLang="en-US" smtClean="0"/>
+              <a:rPr lang="zh-CN" altLang="en-US"/>
               <a:t>第三级</a:t>
             </a:r>
           </a:p>
           <a:p>
             <a:pPr lvl="3"/>
             <a:r>
-              <a:rPr lang="zh-CN" altLang="en-US" smtClean="0"/>
+              <a:rPr lang="zh-CN" altLang="en-US"/>
               <a:t>第四级</a:t>
             </a:r>
           </a:p>
           <a:p>
             <a:pPr lvl="4"/>
             <a:r>
-              <a:rPr lang="zh-CN" altLang="en-US" smtClean="0"/>
+              <a:rPr lang="zh-CN" altLang="en-US"/>
               <a:t>第五级</a:t>
             </a:r>
-            <a:endParaRPr lang="zh-CN" altLang="en-US"/>
           </a:p>
         </p:txBody>
       </p:sp>
@@ -4722,7 +4737,7 @@
               <a:pPr>
                 <a:defRPr/>
               </a:pPr>
-              <a:t>2019/10/23</a:t>
+              <a:t>2019/12/19</a:t>
             </a:fld>
             <a:endParaRPr lang="zh-CN" altLang="en-US"/>
           </a:p>
@@ -4837,10 +4852,9 @@
           <a:lstStyle/>
           <a:p>
             <a:r>
-              <a:rPr lang="zh-CN" altLang="en-US" smtClean="0"/>
+              <a:rPr lang="zh-CN" altLang="en-US"/>
               <a:t>单击此处编辑母版标题样式</a:t>
             </a:r>
-            <a:endParaRPr lang="zh-CN" altLang="en-US"/>
           </a:p>
         </p:txBody>
       </p:sp>
@@ -4903,7 +4917,7 @@
           <a:p>
             <a:pPr lvl="0"/>
             <a:r>
-              <a:rPr lang="zh-CN" altLang="en-US" smtClean="0"/>
+              <a:rPr lang="zh-CN" altLang="en-US"/>
               <a:t>单击此处编辑母版文本样式</a:t>
             </a:r>
           </a:p>
@@ -4931,38 +4945,37 @@
           <a:p>
             <a:pPr lvl="0"/>
             <a:r>
-              <a:rPr lang="zh-CN" altLang="en-US" smtClean="0"/>
+              <a:rPr lang="zh-CN" altLang="en-US"/>
               <a:t>单击此处编辑母版文本样式</a:t>
             </a:r>
           </a:p>
           <a:p>
             <a:pPr lvl="1"/>
             <a:r>
-              <a:rPr lang="zh-CN" altLang="en-US" smtClean="0"/>
+              <a:rPr lang="zh-CN" altLang="en-US"/>
               <a:t>第二级</a:t>
             </a:r>
           </a:p>
           <a:p>
             <a:pPr lvl="2"/>
             <a:r>
-              <a:rPr lang="zh-CN" altLang="en-US" smtClean="0"/>
+              <a:rPr lang="zh-CN" altLang="en-US"/>
               <a:t>第三级</a:t>
             </a:r>
           </a:p>
           <a:p>
             <a:pPr lvl="3"/>
             <a:r>
-              <a:rPr lang="zh-CN" altLang="en-US" smtClean="0"/>
+              <a:rPr lang="zh-CN" altLang="en-US"/>
               <a:t>第四级</a:t>
             </a:r>
           </a:p>
           <a:p>
             <a:pPr lvl="4"/>
             <a:r>
-              <a:rPr lang="zh-CN" altLang="en-US" smtClean="0"/>
+              <a:rPr lang="zh-CN" altLang="en-US"/>
               <a:t>第五级</a:t>
             </a:r>
-            <a:endParaRPr lang="zh-CN" altLang="en-US"/>
           </a:p>
         </p:txBody>
       </p:sp>
@@ -5025,7 +5038,7 @@
           <a:p>
             <a:pPr lvl="0"/>
             <a:r>
-              <a:rPr lang="zh-CN" altLang="en-US" smtClean="0"/>
+              <a:rPr lang="zh-CN" altLang="en-US"/>
               <a:t>单击此处编辑母版文本样式</a:t>
             </a:r>
           </a:p>
@@ -5053,38 +5066,37 @@
           <a:p>
             <a:pPr lvl="0"/>
             <a:r>
-              <a:rPr lang="zh-CN" altLang="en-US" smtClean="0"/>
+              <a:rPr lang="zh-CN" altLang="en-US"/>
               <a:t>单击此处编辑母版文本样式</a:t>
             </a:r>
           </a:p>
           <a:p>
             <a:pPr lvl="1"/>
             <a:r>
-              <a:rPr lang="zh-CN" altLang="en-US" smtClean="0"/>
+              <a:rPr lang="zh-CN" altLang="en-US"/>
               <a:t>第二级</a:t>
             </a:r>
           </a:p>
           <a:p>
             <a:pPr lvl="2"/>
             <a:r>
-              <a:rPr lang="zh-CN" altLang="en-US" smtClean="0"/>
+              <a:rPr lang="zh-CN" altLang="en-US"/>
               <a:t>第三级</a:t>
             </a:r>
           </a:p>
           <a:p>
             <a:pPr lvl="3"/>
             <a:r>
-              <a:rPr lang="zh-CN" altLang="en-US" smtClean="0"/>
+              <a:rPr lang="zh-CN" altLang="en-US"/>
               <a:t>第四级</a:t>
             </a:r>
           </a:p>
           <a:p>
             <a:pPr lvl="4"/>
             <a:r>
-              <a:rPr lang="zh-CN" altLang="en-US" smtClean="0"/>
+              <a:rPr lang="zh-CN" altLang="en-US"/>
               <a:t>第五级</a:t>
             </a:r>
-            <a:endParaRPr lang="zh-CN" altLang="en-US"/>
           </a:p>
         </p:txBody>
       </p:sp>
@@ -5117,7 +5129,7 @@
               <a:pPr>
                 <a:defRPr/>
               </a:pPr>
-              <a:t>2019/10/23</a:t>
+              <a:t>2019/12/19</a:t>
             </a:fld>
             <a:endParaRPr lang="zh-CN" altLang="en-US"/>
           </a:p>
@@ -5227,10 +5239,9 @@
           <a:lstStyle/>
           <a:p>
             <a:r>
-              <a:rPr lang="zh-CN" altLang="en-US" smtClean="0"/>
+              <a:rPr lang="zh-CN" altLang="en-US"/>
               <a:t>单击此处编辑母版标题样式</a:t>
             </a:r>
-            <a:endParaRPr lang="zh-CN" altLang="en-US"/>
           </a:p>
         </p:txBody>
       </p:sp>
@@ -5263,7 +5274,7 @@
               <a:pPr>
                 <a:defRPr/>
               </a:pPr>
-              <a:t>2019/10/23</a:t>
+              <a:t>2019/12/19</a:t>
             </a:fld>
             <a:endParaRPr lang="zh-CN" altLang="en-US"/>
           </a:p>
@@ -5386,7 +5397,7 @@
               <a:pPr>
                 <a:defRPr/>
               </a:pPr>
-              <a:t>2019/10/23</a:t>
+              <a:t>2019/12/19</a:t>
             </a:fld>
             <a:endParaRPr lang="zh-CN" altLang="en-US"/>
           </a:p>
@@ -5505,10 +5516,9 @@
           </a:lstStyle>
           <a:p>
             <a:r>
-              <a:rPr lang="zh-CN" altLang="en-US" smtClean="0"/>
+              <a:rPr lang="zh-CN" altLang="en-US"/>
               <a:t>单击此处编辑母版标题样式</a:t>
             </a:r>
-            <a:endParaRPr lang="zh-CN" altLang="en-US"/>
           </a:p>
         </p:txBody>
       </p:sp>
@@ -5562,38 +5572,37 @@
           <a:p>
             <a:pPr lvl="0"/>
             <a:r>
-              <a:rPr lang="zh-CN" altLang="en-US" smtClean="0"/>
+              <a:rPr lang="zh-CN" altLang="en-US"/>
               <a:t>单击此处编辑母版文本样式</a:t>
             </a:r>
           </a:p>
           <a:p>
             <a:pPr lvl="1"/>
             <a:r>
-              <a:rPr lang="zh-CN" altLang="en-US" smtClean="0"/>
+              <a:rPr lang="zh-CN" altLang="en-US"/>
               <a:t>第二级</a:t>
             </a:r>
           </a:p>
           <a:p>
             <a:pPr lvl="2"/>
             <a:r>
-              <a:rPr lang="zh-CN" altLang="en-US" smtClean="0"/>
+              <a:rPr lang="zh-CN" altLang="en-US"/>
               <a:t>第三级</a:t>
             </a:r>
           </a:p>
           <a:p>
             <a:pPr lvl="3"/>
             <a:r>
-              <a:rPr lang="zh-CN" altLang="en-US" smtClean="0"/>
+              <a:rPr lang="zh-CN" altLang="en-US"/>
               <a:t>第四级</a:t>
             </a:r>
           </a:p>
           <a:p>
             <a:pPr lvl="4"/>
             <a:r>
-              <a:rPr lang="zh-CN" altLang="en-US" smtClean="0"/>
+              <a:rPr lang="zh-CN" altLang="en-US"/>
               <a:t>第五级</a:t>
             </a:r>
-            <a:endParaRPr lang="zh-CN" altLang="en-US"/>
           </a:p>
         </p:txBody>
       </p:sp>
@@ -5656,7 +5665,7 @@
           <a:p>
             <a:pPr lvl="0"/>
             <a:r>
-              <a:rPr lang="zh-CN" altLang="en-US" smtClean="0"/>
+              <a:rPr lang="zh-CN" altLang="en-US"/>
               <a:t>单击此处编辑母版文本样式</a:t>
             </a:r>
           </a:p>
@@ -5691,7 +5700,7 @@
               <a:pPr>
                 <a:defRPr/>
               </a:pPr>
-              <a:t>2019/10/23</a:t>
+              <a:t>2019/12/19</a:t>
             </a:fld>
             <a:endParaRPr lang="zh-CN" altLang="en-US"/>
           </a:p>
@@ -5810,10 +5819,9 @@
           </a:lstStyle>
           <a:p>
             <a:r>
-              <a:rPr lang="zh-CN" altLang="en-US" smtClean="0"/>
+              <a:rPr lang="zh-CN" altLang="en-US"/>
               <a:t>单击此处编辑母版标题样式</a:t>
             </a:r>
-            <a:endParaRPr lang="zh-CN" altLang="en-US"/>
           </a:p>
         </p:txBody>
       </p:sp>
@@ -5876,7 +5884,7 @@
           <a:p>
             <a:pPr lvl="0"/>
             <a:r>
-              <a:rPr lang="zh-CN" altLang="en-US" noProof="0" smtClean="0"/>
+              <a:rPr lang="zh-CN" altLang="en-US" noProof="0"/>
               <a:t>单击图标添加图片</a:t>
             </a:r>
           </a:p>
@@ -5941,7 +5949,7 @@
           <a:p>
             <a:pPr lvl="0"/>
             <a:r>
-              <a:rPr lang="zh-CN" altLang="en-US" smtClean="0"/>
+              <a:rPr lang="zh-CN" altLang="en-US"/>
               <a:t>单击此处编辑母版文本样式</a:t>
             </a:r>
           </a:p>
@@ -5976,7 +5984,7 @@
               <a:pPr>
                 <a:defRPr/>
               </a:pPr>
-              <a:t>2019/10/23</a:t>
+              <a:t>2019/12/19</a:t>
             </a:fld>
             <a:endParaRPr lang="zh-CN" altLang="en-US"/>
           </a:p>
@@ -6103,11 +6111,6 @@
             <a:noFill/>
           </a:ln>
           <a:effectLst/>
-          <a:extLst>
-            <a:ext uri="{909E8E84-426E-40DD-AFC4-6F175D3DCCD1}"/>
-            <a:ext uri="{91240B29-F687-4F45-9708-019B960494DF}"/>
-            <a:ext uri="{AF507438-7753-43E0-B8FC-AC1667EBCBE1}"/>
-          </a:extLst>
         </p:spPr>
         <p:txBody>
           <a:bodyPr vert="horz" wrap="square" lIns="91440" tIns="45720" rIns="91440" bIns="45720" numCol="1" anchor="b" anchorCtr="0" compatLnSpc="1">
@@ -6119,10 +6122,10 @@
           <a:p>
             <a:pPr lvl="0"/>
             <a:r>
-              <a:rPr lang="zh-CN" altLang="en-US" smtClean="0"/>
+              <a:rPr lang="zh-CN" altLang="en-US"/>
               <a:t>单击此处编辑母版标题样式</a:t>
             </a:r>
-            <a:endParaRPr lang="en-US" altLang="zh-CN" smtClean="0"/>
+            <a:endParaRPr lang="en-US" altLang="zh-CN"/>
           </a:p>
         </p:txBody>
       </p:sp>
@@ -6162,38 +6165,38 @@
           <a:p>
             <a:pPr lvl="0"/>
             <a:r>
-              <a:rPr lang="zh-CN" altLang="en-US" smtClean="0"/>
+              <a:rPr lang="zh-CN" altLang="en-US"/>
               <a:t>单击此处编辑母版文本样式</a:t>
             </a:r>
           </a:p>
           <a:p>
             <a:pPr lvl="1"/>
             <a:r>
-              <a:rPr lang="zh-CN" altLang="en-US" smtClean="0"/>
+              <a:rPr lang="zh-CN" altLang="en-US"/>
               <a:t>第二级</a:t>
             </a:r>
           </a:p>
           <a:p>
             <a:pPr lvl="2"/>
             <a:r>
-              <a:rPr lang="zh-CN" altLang="en-US" smtClean="0"/>
+              <a:rPr lang="zh-CN" altLang="en-US"/>
               <a:t>第三级</a:t>
             </a:r>
           </a:p>
           <a:p>
             <a:pPr lvl="3"/>
             <a:r>
-              <a:rPr lang="zh-CN" altLang="en-US" smtClean="0"/>
+              <a:rPr lang="zh-CN" altLang="en-US"/>
               <a:t>第四级</a:t>
             </a:r>
           </a:p>
           <a:p>
             <a:pPr lvl="4"/>
             <a:r>
-              <a:rPr lang="zh-CN" altLang="en-US" smtClean="0"/>
+              <a:rPr lang="zh-CN" altLang="en-US"/>
               <a:t>第五级</a:t>
             </a:r>
-            <a:endParaRPr lang="en-US" altLang="zh-CN" smtClean="0"/>
+            <a:endParaRPr lang="en-US" altLang="zh-CN"/>
           </a:p>
         </p:txBody>
       </p:sp>
@@ -6341,10 +6344,6 @@
             <a:tailEnd/>
           </a:ln>
           <a:effectLst/>
-          <a:extLst>
-            <a:ext uri="{909E8E84-426E-40DD-AFC4-6F175D3DCCD1}"/>
-            <a:ext uri="{AF507438-7753-43E0-B8FC-AC1667EBCBE1}"/>
-          </a:extLst>
         </p:spPr>
         <p:txBody>
           <a:bodyPr/>
@@ -6389,11 +6388,6 @@
             <a:noFill/>
           </a:ln>
           <a:effectLst/>
-          <a:extLst>
-            <a:ext uri="{909E8E84-426E-40DD-AFC4-6F175D3DCCD1}"/>
-            <a:ext uri="{91240B29-F687-4F45-9708-019B960494DF}"/>
-            <a:ext uri="{AF507438-7753-43E0-B8FC-AC1667EBCBE1}"/>
-          </a:extLst>
         </p:spPr>
         <p:txBody>
           <a:bodyPr vert="horz" wrap="square" lIns="91440" tIns="45720" rIns="91440" bIns="45720" numCol="1" anchor="t" anchorCtr="0" compatLnSpc="1">
@@ -6430,7 +6424,7 @@
               <a:pPr>
                 <a:defRPr/>
               </a:pPr>
-              <a:t>2019/10/23</a:t>
+              <a:t>2019/12/19</a:t>
             </a:fld>
             <a:endParaRPr lang="zh-CN" altLang="en-US"/>
           </a:p>
@@ -6459,11 +6453,6 @@
             <a:noFill/>
           </a:ln>
           <a:effectLst/>
-          <a:extLst>
-            <a:ext uri="{909E8E84-426E-40DD-AFC4-6F175D3DCCD1}"/>
-            <a:ext uri="{91240B29-F687-4F45-9708-019B960494DF}"/>
-            <a:ext uri="{AF507438-7753-43E0-B8FC-AC1667EBCBE1}"/>
-          </a:extLst>
         </p:spPr>
         <p:txBody>
           <a:bodyPr vert="horz" wrap="square" lIns="91440" tIns="45720" rIns="91440" bIns="45720" numCol="1" anchor="t" anchorCtr="0" compatLnSpc="1">
@@ -6522,11 +6511,6 @@
             <a:noFill/>
           </a:ln>
           <a:effectLst/>
-          <a:extLst>
-            <a:ext uri="{909E8E84-426E-40DD-AFC4-6F175D3DCCD1}"/>
-            <a:ext uri="{91240B29-F687-4F45-9708-019B960494DF}"/>
-            <a:ext uri="{AF507438-7753-43E0-B8FC-AC1667EBCBE1}"/>
-          </a:extLst>
         </p:spPr>
         <p:txBody>
           <a:bodyPr vert="horz" wrap="square" lIns="91440" tIns="45720" rIns="91440" bIns="45720" numCol="1" anchor="t" anchorCtr="0" compatLnSpc="1">
@@ -6671,13 +6655,6 @@
     <p:sldLayoutId id="2147483682" r:id="rId10"/>
     <p:sldLayoutId id="2147483683" r:id="rId11"/>
   </p:sldLayoutIdLst>
-  <p:timing>
-    <p:tnLst>
-      <p:par>
-        <p:cTn id="1" dur="indefinite" restart="never" nodeType="tmRoot"/>
-      </p:par>
-    </p:tnLst>
-  </p:timing>
   <p:txStyles>
     <p:titleStyle>
       <a:lvl1pPr algn="l" rtl="0" fontAlgn="base">
@@ -7203,7 +7180,7 @@
           <a:p>
             <a:pPr lvl="0"/>
             <a:r>
-              <a:rPr lang="zh-CN" altLang="en-US" smtClean="0"/>
+              <a:rPr lang="zh-CN" altLang="en-US"/>
               <a:t>单击此处编辑母版标题样式</a:t>
             </a:r>
           </a:p>
@@ -7245,35 +7222,35 @@
           <a:p>
             <a:pPr lvl="0"/>
             <a:r>
-              <a:rPr lang="zh-CN" altLang="en-US" smtClean="0"/>
+              <a:rPr lang="zh-CN" altLang="en-US"/>
               <a:t>单击此处编辑母版文本样式</a:t>
             </a:r>
           </a:p>
           <a:p>
             <a:pPr lvl="1"/>
             <a:r>
-              <a:rPr lang="zh-CN" altLang="en-US" smtClean="0"/>
+              <a:rPr lang="zh-CN" altLang="en-US"/>
               <a:t>第二级</a:t>
             </a:r>
           </a:p>
           <a:p>
             <a:pPr lvl="2"/>
             <a:r>
-              <a:rPr lang="zh-CN" altLang="en-US" smtClean="0"/>
+              <a:rPr lang="zh-CN" altLang="en-US"/>
               <a:t>第三级</a:t>
             </a:r>
           </a:p>
           <a:p>
             <a:pPr lvl="3"/>
             <a:r>
-              <a:rPr lang="zh-CN" altLang="en-US" smtClean="0"/>
+              <a:rPr lang="zh-CN" altLang="en-US"/>
               <a:t>第四级</a:t>
             </a:r>
           </a:p>
           <a:p>
             <a:pPr lvl="4"/>
             <a:r>
-              <a:rPr lang="zh-CN" altLang="en-US" smtClean="0"/>
+              <a:rPr lang="zh-CN" altLang="en-US"/>
               <a:t>第五级</a:t>
             </a:r>
           </a:p>
@@ -7302,11 +7279,6 @@
             <a:noFill/>
           </a:ln>
           <a:effectLst/>
-          <a:extLst>
-            <a:ext uri="{909E8E84-426E-40DD-AFC4-6F175D3DCCD1}"/>
-            <a:ext uri="{91240B29-F687-4F45-9708-019B960494DF}"/>
-            <a:ext uri="{AF507438-7753-43E0-B8FC-AC1667EBCBE1}"/>
-          </a:extLst>
         </p:spPr>
         <p:txBody>
           <a:bodyPr vert="horz" wrap="square" lIns="91440" tIns="45720" rIns="91440" bIns="45720" numCol="1" anchor="t" anchorCtr="0" compatLnSpc="1">
@@ -7343,7 +7315,7 @@
               <a:pPr>
                 <a:defRPr/>
               </a:pPr>
-              <a:t>2019/10/23</a:t>
+              <a:t>2019/12/19</a:t>
             </a:fld>
             <a:endParaRPr lang="en-US" altLang="zh-CN"/>
           </a:p>
@@ -7372,11 +7344,6 @@
             <a:noFill/>
           </a:ln>
           <a:effectLst/>
-          <a:extLst>
-            <a:ext uri="{909E8E84-426E-40DD-AFC4-6F175D3DCCD1}"/>
-            <a:ext uri="{91240B29-F687-4F45-9708-019B960494DF}"/>
-            <a:ext uri="{AF507438-7753-43E0-B8FC-AC1667EBCBE1}"/>
-          </a:extLst>
         </p:spPr>
         <p:txBody>
           <a:bodyPr vert="horz" wrap="square" lIns="91440" tIns="45720" rIns="91440" bIns="45720" numCol="1" anchor="t" anchorCtr="0" compatLnSpc="1">
@@ -7438,11 +7405,6 @@
             <a:noFill/>
           </a:ln>
           <a:effectLst/>
-          <a:extLst>
-            <a:ext uri="{909E8E84-426E-40DD-AFC4-6F175D3DCCD1}"/>
-            <a:ext uri="{91240B29-F687-4F45-9708-019B960494DF}"/>
-            <a:ext uri="{AF507438-7753-43E0-B8FC-AC1667EBCBE1}"/>
-          </a:extLst>
         </p:spPr>
         <p:txBody>
           <a:bodyPr vert="horz" wrap="square" lIns="91440" tIns="45720" rIns="91440" bIns="45720" numCol="1" anchor="t" anchorCtr="0" compatLnSpc="1">
@@ -7939,14 +7901,13 @@
               <a:defRPr/>
             </a:pPr>
             <a:r>
-              <a:rPr lang="en-US" altLang="zh-CN" sz="4800" dirty="0" smtClean="0"/>
+              <a:rPr lang="en-US" altLang="zh-CN" sz="4800" dirty="0"/>
               <a:t>Pintos</a:t>
             </a:r>
             <a:r>
-              <a:rPr lang="zh-CN" altLang="en-US" sz="4800" dirty="0" smtClean="0"/>
+              <a:rPr lang="zh-CN" altLang="en-US" sz="4800" dirty="0"/>
               <a:t>实验参考结果</a:t>
             </a:r>
-            <a:endParaRPr lang="zh-CN" altLang="en-US" sz="4800" dirty="0"/>
           </a:p>
         </p:txBody>
       </p:sp>
@@ -7955,13 +7916,6 @@
   <p:clrMapOvr>
     <a:masterClrMapping/>
   </p:clrMapOvr>
-  <p:timing>
-    <p:tnLst>
-      <p:par>
-        <p:cTn id="1" dur="indefinite" restart="never" nodeType="tmRoot"/>
-      </p:par>
-    </p:tnLst>
-  </p:timing>
 </p:sld>
 </file>
 
@@ -8001,10 +7955,9 @@
               <a:defRPr/>
             </a:pPr>
             <a:r>
-              <a:rPr lang="zh-CN" altLang="en-US" dirty="0" smtClean="0"/>
+              <a:rPr lang="zh-CN" altLang="en-US" dirty="0"/>
               <a:t>单个测试结果举例说明</a:t>
             </a:r>
-            <a:endParaRPr lang="zh-CN" altLang="en-US" dirty="0"/>
           </a:p>
         </p:txBody>
       </p:sp>
@@ -8029,44 +7982,44 @@
           <a:lstStyle/>
           <a:p>
             <a:r>
-              <a:rPr lang="zh-CN" altLang="en-US" sz="2400" smtClean="0"/>
+              <a:rPr lang="zh-CN" altLang="en-US" sz="2400"/>
               <a:t>退出信息</a:t>
             </a:r>
             <a:r>
-              <a:rPr lang="en-US" altLang="zh-CN" sz="2400" smtClean="0"/>
+              <a:rPr lang="en-US" altLang="zh-CN" sz="2400"/>
               <a:t>----</a:t>
             </a:r>
             <a:r>
-              <a:rPr lang="zh-CN" altLang="en-US" sz="2400" smtClean="0"/>
+              <a:rPr lang="zh-CN" altLang="en-US" sz="2400"/>
               <a:t>输出结果应有退出信息，寻找要看以下目录的对应</a:t>
             </a:r>
             <a:r>
-              <a:rPr lang="en-US" altLang="zh-CN" sz="2400" smtClean="0"/>
+              <a:rPr lang="en-US" altLang="zh-CN" sz="2400"/>
               <a:t>output</a:t>
             </a:r>
             <a:r>
-              <a:rPr lang="zh-CN" altLang="en-US" sz="2400" smtClean="0"/>
+              <a:rPr lang="zh-CN" altLang="en-US" sz="2400"/>
               <a:t>后缀文件</a:t>
             </a:r>
-            <a:endParaRPr lang="en-US" altLang="zh-CN" sz="2400" smtClean="0"/>
-          </a:p>
-          <a:p>
-            <a:r>
-              <a:rPr lang="zh-CN" altLang="en-US" sz="2400" smtClean="0"/>
+            <a:endParaRPr lang="en-US" altLang="zh-CN" sz="2400"/>
+          </a:p>
+          <a:p>
+            <a:r>
+              <a:rPr lang="zh-CN" altLang="en-US" sz="2400"/>
               <a:t>如：                                                                                            （调用</a:t>
             </a:r>
             <a:r>
-              <a:rPr lang="en-US" altLang="zh-CN" sz="2400" smtClean="0"/>
+              <a:rPr lang="en-US" altLang="zh-CN" sz="2400"/>
               <a:t>open</a:t>
             </a:r>
             <a:r>
-              <a:rPr lang="zh-CN" altLang="en-US" sz="2400" smtClean="0"/>
+              <a:rPr lang="zh-CN" altLang="en-US" sz="2400"/>
               <a:t>命令）</a:t>
             </a:r>
-            <a:endParaRPr lang="en-US" altLang="zh-CN" sz="2400" smtClean="0"/>
-          </a:p>
-          <a:p>
-            <a:endParaRPr lang="zh-CN" altLang="en-US" sz="2400" smtClean="0"/>
+            <a:endParaRPr lang="en-US" altLang="zh-CN" sz="2400"/>
+          </a:p>
+          <a:p>
+            <a:endParaRPr lang="zh-CN" altLang="en-US" sz="2400"/>
           </a:p>
         </p:txBody>
       </p:sp>
@@ -8361,13 +8314,6 @@
   <p:clrMapOvr>
     <a:masterClrMapping/>
   </p:clrMapOvr>
-  <p:timing>
-    <p:tnLst>
-      <p:par>
-        <p:cTn id="1" dur="indefinite" restart="never" nodeType="tmRoot"/>
-      </p:par>
-    </p:tnLst>
-  </p:timing>
 </p:sld>
 </file>
 
@@ -8407,14 +8353,13 @@
               <a:defRPr/>
             </a:pPr>
             <a:r>
-              <a:rPr lang="en-US" altLang="zh-CN" dirty="0" smtClean="0"/>
+              <a:rPr lang="en-US" altLang="zh-CN" dirty="0"/>
               <a:t>Project 1 </a:t>
             </a:r>
             <a:r>
-              <a:rPr lang="zh-CN" altLang="en-US" dirty="0" smtClean="0"/>
+              <a:rPr lang="zh-CN" altLang="en-US" dirty="0"/>
               <a:t>结果</a:t>
             </a:r>
-            <a:endParaRPr lang="zh-CN" altLang="en-US" dirty="0"/>
           </a:p>
         </p:txBody>
       </p:sp>
@@ -8437,18 +8382,18 @@
               <a:defRPr/>
             </a:pPr>
             <a:r>
-              <a:rPr lang="zh-CN" altLang="en-US" dirty="0" smtClean="0"/>
+              <a:rPr lang="zh-CN" altLang="en-US" dirty="0"/>
               <a:t>通过在</a:t>
             </a:r>
             <a:r>
-              <a:rPr lang="en-US" altLang="zh-CN" dirty="0" smtClean="0"/>
+              <a:rPr lang="en-US" altLang="zh-CN" dirty="0"/>
               <a:t>threads</a:t>
             </a:r>
             <a:r>
-              <a:rPr lang="zh-CN" altLang="en-US" dirty="0" smtClean="0"/>
+              <a:rPr lang="zh-CN" altLang="en-US" dirty="0"/>
               <a:t>文件夹内</a:t>
             </a:r>
-            <a:endParaRPr lang="en-US" altLang="zh-CN" dirty="0" smtClean="0"/>
+            <a:endParaRPr lang="en-US" altLang="zh-CN" dirty="0"/>
           </a:p>
           <a:p>
             <a:pPr marL="0" indent="0">
@@ -8458,17 +8403,13 @@
             </a:pPr>
             <a:r>
               <a:rPr lang="en-US" altLang="zh-CN" dirty="0"/>
-              <a:t>	</a:t>
-            </a:r>
-            <a:r>
-              <a:rPr lang="en-US" altLang="zh-CN" dirty="0" smtClean="0"/>
-              <a:t>builds</a:t>
-            </a:r>
-            <a:r>
-              <a:rPr lang="zh-CN" altLang="en-US" dirty="0" smtClean="0"/>
+              <a:t>	builds</a:t>
+            </a:r>
+            <a:r>
+              <a:rPr lang="zh-CN" altLang="en-US" dirty="0"/>
               <a:t>文件下执行</a:t>
             </a:r>
-            <a:endParaRPr lang="en-US" altLang="zh-CN" dirty="0" smtClean="0"/>
+            <a:endParaRPr lang="en-US" altLang="zh-CN" dirty="0"/>
           </a:p>
           <a:p>
             <a:pPr marL="0" indent="0">
@@ -8477,11 +8418,11 @@
               <a:defRPr/>
             </a:pPr>
             <a:r>
-              <a:rPr lang="en-US" altLang="zh-CN" dirty="0" smtClean="0"/>
+              <a:rPr lang="en-US" altLang="zh-CN" dirty="0"/>
               <a:t>	</a:t>
             </a:r>
             <a:r>
-              <a:rPr lang="en-US" altLang="zh-CN" dirty="0" smtClean="0">
+              <a:rPr lang="en-US" altLang="zh-CN" dirty="0">
                 <a:solidFill>
                   <a:srgbClr val="FF0000"/>
                 </a:solidFill>
@@ -8489,10 +8430,10 @@
               <a:t>make check</a:t>
             </a:r>
             <a:r>
-              <a:rPr lang="zh-CN" altLang="en-US" dirty="0" smtClean="0"/>
+              <a:rPr lang="zh-CN" altLang="en-US" dirty="0"/>
               <a:t>方法</a:t>
             </a:r>
-            <a:endParaRPr lang="en-US" altLang="zh-CN" dirty="0" smtClean="0"/>
+            <a:endParaRPr lang="en-US" altLang="zh-CN" dirty="0"/>
           </a:p>
           <a:p>
             <a:pPr marL="0" indent="0">
@@ -8501,14 +8442,14 @@
               <a:defRPr/>
             </a:pPr>
             <a:r>
-              <a:rPr lang="en-US" altLang="zh-CN" dirty="0" smtClean="0"/>
+              <a:rPr lang="en-US" altLang="zh-CN" dirty="0"/>
               <a:t>	</a:t>
             </a:r>
             <a:r>
-              <a:rPr lang="zh-CN" altLang="en-US" dirty="0" smtClean="0"/>
+              <a:rPr lang="zh-CN" altLang="en-US" dirty="0"/>
               <a:t>进行整体结果检查</a:t>
             </a:r>
-            <a:endParaRPr lang="en-US" altLang="zh-CN" dirty="0" smtClean="0"/>
+            <a:endParaRPr lang="en-US" altLang="zh-CN" dirty="0"/>
           </a:p>
           <a:p>
             <a:pPr marL="0" indent="0">
@@ -8516,17 +8457,17 @@
               <a:buNone/>
               <a:defRPr/>
             </a:pPr>
-            <a:endParaRPr lang="en-US" altLang="zh-CN" dirty="0" smtClean="0"/>
+            <a:endParaRPr lang="en-US" altLang="zh-CN" dirty="0"/>
           </a:p>
           <a:p>
             <a:pPr>
               <a:defRPr/>
             </a:pPr>
             <a:r>
-              <a:rPr lang="zh-CN" altLang="en-US" dirty="0" smtClean="0"/>
+              <a:rPr lang="zh-CN" altLang="en-US" dirty="0"/>
               <a:t>结果应如右图</a:t>
             </a:r>
-            <a:endParaRPr lang="en-US" altLang="zh-CN" dirty="0" smtClean="0"/>
+            <a:endParaRPr lang="en-US" altLang="zh-CN" dirty="0"/>
           </a:p>
           <a:p>
             <a:pPr>
@@ -8573,13 +8514,6 @@
   <p:clrMapOvr>
     <a:masterClrMapping/>
   </p:clrMapOvr>
-  <p:timing>
-    <p:tnLst>
-      <p:par>
-        <p:cTn id="1" dur="indefinite" restart="never" nodeType="tmRoot"/>
-      </p:par>
-    </p:tnLst>
-  </p:timing>
 </p:sld>
 </file>
 
@@ -8619,10 +8553,9 @@
               <a:defRPr/>
             </a:pPr>
             <a:r>
-              <a:rPr lang="zh-CN" altLang="en-US" dirty="0" smtClean="0"/>
+              <a:rPr lang="zh-CN" altLang="en-US" dirty="0"/>
               <a:t>测试结果说明</a:t>
             </a:r>
-            <a:endParaRPr lang="zh-CN" altLang="en-US" dirty="0"/>
           </a:p>
         </p:txBody>
       </p:sp>
@@ -8645,7 +8578,7 @@
               <a:defRPr/>
             </a:pPr>
             <a:r>
-              <a:rPr lang="zh-CN" altLang="en-US" dirty="0" smtClean="0">
+              <a:rPr lang="zh-CN" altLang="en-US" dirty="0">
                 <a:solidFill>
                   <a:schemeClr val="accent4"/>
                 </a:solidFill>
@@ -8653,49 +8586,49 @@
               <a:t>黄色部分</a:t>
             </a:r>
             <a:r>
-              <a:rPr lang="zh-CN" altLang="en-US" dirty="0" smtClean="0"/>
+              <a:rPr lang="zh-CN" altLang="en-US" dirty="0"/>
               <a:t>表示通过没通过</a:t>
             </a:r>
-            <a:endParaRPr lang="en-US" altLang="zh-CN" dirty="0" smtClean="0"/>
+            <a:endParaRPr lang="en-US" altLang="zh-CN" dirty="0"/>
           </a:p>
           <a:p>
             <a:pPr lvl="1">
               <a:defRPr/>
             </a:pPr>
             <a:r>
-              <a:rPr lang="en-US" altLang="zh-CN" dirty="0" smtClean="0"/>
+              <a:rPr lang="en-US" altLang="zh-CN" dirty="0"/>
               <a:t>Pass</a:t>
             </a:r>
             <a:r>
-              <a:rPr lang="zh-CN" altLang="en-US" dirty="0" smtClean="0"/>
+              <a:rPr lang="zh-CN" altLang="en-US" dirty="0"/>
               <a:t>为通过</a:t>
             </a:r>
-            <a:endParaRPr lang="en-US" altLang="zh-CN" dirty="0" smtClean="0"/>
+            <a:endParaRPr lang="en-US" altLang="zh-CN" dirty="0"/>
           </a:p>
           <a:p>
             <a:pPr lvl="1">
               <a:defRPr/>
             </a:pPr>
             <a:r>
-              <a:rPr lang="en-US" altLang="zh-CN" dirty="0" smtClean="0"/>
+              <a:rPr lang="en-US" altLang="zh-CN" dirty="0"/>
               <a:t>FAIL</a:t>
             </a:r>
             <a:r>
-              <a:rPr lang="zh-CN" altLang="en-US" dirty="0" smtClean="0"/>
+              <a:rPr lang="zh-CN" altLang="en-US" dirty="0"/>
               <a:t>为未通过</a:t>
             </a:r>
-            <a:endParaRPr lang="en-US" altLang="zh-CN" dirty="0" smtClean="0"/>
+            <a:endParaRPr lang="en-US" altLang="zh-CN" dirty="0"/>
           </a:p>
           <a:p>
             <a:pPr lvl="1">
               <a:defRPr/>
             </a:pPr>
             <a:r>
-              <a:rPr lang="zh-CN" altLang="en-US" dirty="0" smtClean="0"/>
+              <a:rPr lang="zh-CN" altLang="en-US" dirty="0"/>
               <a:t>应全为</a:t>
             </a:r>
             <a:r>
-              <a:rPr lang="en-US" altLang="zh-CN" dirty="0" smtClean="0"/>
+              <a:rPr lang="en-US" altLang="zh-CN" dirty="0"/>
               <a:t>pass</a:t>
             </a:r>
           </a:p>
@@ -8704,7 +8637,7 @@
               <a:defRPr/>
             </a:pPr>
             <a:r>
-              <a:rPr lang="zh-CN" altLang="en-US" dirty="0" smtClean="0">
+              <a:rPr lang="zh-CN" altLang="en-US" dirty="0">
                 <a:solidFill>
                   <a:srgbClr val="FF0000"/>
                 </a:solidFill>
@@ -8712,17 +8645,17 @@
               <a:t>红色部分</a:t>
             </a:r>
             <a:r>
-              <a:rPr lang="zh-CN" altLang="en-US" dirty="0" smtClean="0"/>
+              <a:rPr lang="zh-CN" altLang="en-US" dirty="0"/>
               <a:t>为忙等待结果</a:t>
             </a:r>
-            <a:endParaRPr lang="en-US" altLang="zh-CN" dirty="0" smtClean="0"/>
+            <a:endParaRPr lang="en-US" altLang="zh-CN" dirty="0"/>
           </a:p>
           <a:p>
             <a:pPr>
               <a:defRPr/>
             </a:pPr>
             <a:r>
-              <a:rPr lang="zh-CN" altLang="en-US" dirty="0" smtClean="0">
+              <a:rPr lang="zh-CN" altLang="en-US" dirty="0">
                 <a:solidFill>
                   <a:srgbClr val="0070C0"/>
                 </a:solidFill>
@@ -8730,17 +8663,17 @@
               <a:t>蓝色部分</a:t>
             </a:r>
             <a:r>
-              <a:rPr lang="zh-CN" altLang="en-US" dirty="0" smtClean="0"/>
+              <a:rPr lang="zh-CN" altLang="en-US" dirty="0"/>
               <a:t>为优先级结果</a:t>
             </a:r>
-            <a:endParaRPr lang="en-US" altLang="zh-CN" dirty="0" smtClean="0"/>
+            <a:endParaRPr lang="en-US" altLang="zh-CN" dirty="0"/>
           </a:p>
           <a:p>
             <a:pPr>
               <a:defRPr/>
             </a:pPr>
             <a:r>
-              <a:rPr lang="zh-CN" altLang="en-US" dirty="0" smtClean="0">
+              <a:rPr lang="zh-CN" altLang="en-US" dirty="0">
                 <a:solidFill>
                   <a:srgbClr val="00B050"/>
                 </a:solidFill>
@@ -8748,10 +8681,9 @@
               <a:t>绿色部分</a:t>
             </a:r>
             <a:r>
-              <a:rPr lang="zh-CN" altLang="en-US" dirty="0" smtClean="0"/>
+              <a:rPr lang="zh-CN" altLang="en-US" dirty="0"/>
               <a:t>为多级反馈队列结果</a:t>
             </a:r>
-            <a:endParaRPr lang="zh-CN" altLang="en-US" dirty="0"/>
           </a:p>
         </p:txBody>
       </p:sp>
@@ -9010,13 +8942,6 @@
   <p:clrMapOvr>
     <a:masterClrMapping/>
   </p:clrMapOvr>
-  <p:timing>
-    <p:tnLst>
-      <p:par>
-        <p:cTn id="1" dur="indefinite" restart="never" nodeType="tmRoot"/>
-      </p:par>
-    </p:tnLst>
-  </p:timing>
 </p:sld>
 </file>
 
@@ -9056,10 +8981,9 @@
               <a:defRPr/>
             </a:pPr>
             <a:r>
-              <a:rPr lang="zh-CN" altLang="en-US" dirty="0" smtClean="0"/>
+              <a:rPr lang="zh-CN" altLang="en-US" dirty="0"/>
               <a:t>单个测试结果举例说明</a:t>
             </a:r>
-            <a:endParaRPr lang="zh-CN" altLang="en-US" dirty="0"/>
           </a:p>
         </p:txBody>
       </p:sp>
@@ -9084,33 +9008,33 @@
           <a:lstStyle/>
           <a:p>
             <a:r>
-              <a:rPr lang="zh-CN" altLang="en-US" smtClean="0"/>
+              <a:rPr lang="zh-CN" altLang="en-US"/>
               <a:t>忙等待</a:t>
             </a:r>
             <a:r>
-              <a:rPr lang="en-US" altLang="zh-CN" smtClean="0"/>
+              <a:rPr lang="en-US" altLang="zh-CN"/>
               <a:t>----</a:t>
             </a:r>
             <a:r>
-              <a:rPr lang="zh-CN" altLang="en-US" smtClean="0"/>
+              <a:rPr lang="zh-CN" altLang="en-US"/>
               <a:t>结果应该有序输出</a:t>
             </a:r>
             <a:r>
-              <a:rPr lang="zh-CN" altLang="en-US" sz="2200" smtClean="0"/>
+              <a:rPr lang="zh-CN" altLang="en-US" sz="2200"/>
               <a:t>（此处样例为执行</a:t>
             </a:r>
             <a:r>
-              <a:rPr lang="en-US" altLang="zh-CN" sz="2200" smtClean="0"/>
+              <a:rPr lang="en-US" altLang="zh-CN" sz="2200"/>
               <a:t>pintos -- run alarm-multiple</a:t>
             </a:r>
             <a:r>
-              <a:rPr lang="zh-CN" altLang="en-US" sz="2200" smtClean="0"/>
+              <a:rPr lang="zh-CN" altLang="en-US" sz="2200"/>
               <a:t>）</a:t>
             </a:r>
-            <a:endParaRPr lang="en-US" altLang="zh-CN" sz="2200" smtClean="0"/>
-          </a:p>
-          <a:p>
-            <a:endParaRPr lang="zh-CN" altLang="en-US" smtClean="0"/>
+            <a:endParaRPr lang="en-US" altLang="zh-CN" sz="2200"/>
+          </a:p>
+          <a:p>
+            <a:endParaRPr lang="zh-CN" altLang="en-US"/>
           </a:p>
         </p:txBody>
       </p:sp>
@@ -9131,7 +9055,7 @@
         </p:blipFill>
         <p:spPr bwMode="auto">
           <a:xfrm>
-            <a:off x="579438" y="2247900"/>
+            <a:off x="719138" y="2247900"/>
             <a:ext cx="11117262" cy="4610100"/>
           </a:xfrm>
           <a:prstGeom prst="rect">
@@ -9237,13 +9161,6 @@
   <p:clrMapOvr>
     <a:masterClrMapping/>
   </p:clrMapOvr>
-  <p:timing>
-    <p:tnLst>
-      <p:par>
-        <p:cTn id="1" dur="indefinite" restart="never" nodeType="tmRoot"/>
-      </p:par>
-    </p:tnLst>
-  </p:timing>
 </p:sld>
 </file>
 
@@ -9283,10 +9200,9 @@
               <a:defRPr/>
             </a:pPr>
             <a:r>
-              <a:rPr lang="zh-CN" altLang="en-US" dirty="0" smtClean="0"/>
+              <a:rPr lang="zh-CN" altLang="en-US" dirty="0"/>
               <a:t>单个测试结果举例说明</a:t>
             </a:r>
-            <a:endParaRPr lang="zh-CN" altLang="en-US" dirty="0"/>
           </a:p>
         </p:txBody>
       </p:sp>
@@ -9311,33 +9227,33 @@
           <a:lstStyle/>
           <a:p>
             <a:r>
-              <a:rPr lang="zh-CN" altLang="en-US" sz="2400" smtClean="0"/>
+              <a:rPr lang="zh-CN" altLang="en-US" sz="2400"/>
               <a:t>优先级</a:t>
             </a:r>
             <a:r>
-              <a:rPr lang="en-US" altLang="zh-CN" sz="2400" smtClean="0"/>
+              <a:rPr lang="en-US" altLang="zh-CN" sz="2400"/>
               <a:t>----</a:t>
             </a:r>
             <a:r>
-              <a:rPr lang="zh-CN" altLang="en-US" sz="2400" smtClean="0"/>
+              <a:rPr lang="zh-CN" altLang="en-US" sz="2400"/>
               <a:t>结果应该按照优先级大小输出</a:t>
             </a:r>
             <a:r>
-              <a:rPr lang="zh-CN" altLang="en-US" sz="2000" smtClean="0"/>
+              <a:rPr lang="zh-CN" altLang="en-US" sz="2000"/>
               <a:t>（此处样例为执行</a:t>
             </a:r>
             <a:r>
-              <a:rPr lang="en-US" altLang="zh-CN" sz="2000" smtClean="0"/>
+              <a:rPr lang="en-US" altLang="zh-CN" sz="2000"/>
               <a:t>pintos -- run alarm-priority</a:t>
             </a:r>
             <a:r>
-              <a:rPr lang="zh-CN" altLang="en-US" sz="2000" smtClean="0"/>
+              <a:rPr lang="zh-CN" altLang="en-US" sz="2000"/>
               <a:t>）</a:t>
             </a:r>
-            <a:endParaRPr lang="en-US" altLang="zh-CN" sz="2000" smtClean="0"/>
-          </a:p>
-          <a:p>
-            <a:endParaRPr lang="zh-CN" altLang="en-US" smtClean="0"/>
+            <a:endParaRPr lang="en-US" altLang="zh-CN" sz="2000"/>
+          </a:p>
+          <a:p>
+            <a:endParaRPr lang="zh-CN" altLang="en-US"/>
           </a:p>
         </p:txBody>
       </p:sp>
@@ -9464,13 +9380,6 @@
   <p:clrMapOvr>
     <a:masterClrMapping/>
   </p:clrMapOvr>
-  <p:timing>
-    <p:tnLst>
-      <p:par>
-        <p:cTn id="1" dur="indefinite" restart="never" nodeType="tmRoot"/>
-      </p:par>
-    </p:tnLst>
-  </p:timing>
 </p:sld>
 </file>
 
@@ -9510,10 +9419,9 @@
               <a:defRPr/>
             </a:pPr>
             <a:r>
-              <a:rPr lang="zh-CN" altLang="en-US" dirty="0" smtClean="0"/>
+              <a:rPr lang="zh-CN" altLang="en-US" dirty="0"/>
               <a:t>单个测试结果举例说明</a:t>
             </a:r>
-            <a:endParaRPr lang="zh-CN" altLang="en-US" dirty="0"/>
           </a:p>
         </p:txBody>
       </p:sp>
@@ -9538,36 +9446,36 @@
           <a:lstStyle/>
           <a:p>
             <a:r>
-              <a:rPr lang="zh-CN" altLang="en-US" sz="2000" smtClean="0"/>
+              <a:rPr lang="zh-CN" altLang="en-US" sz="2000"/>
               <a:t>多级反馈队列</a:t>
             </a:r>
             <a:r>
-              <a:rPr lang="en-US" altLang="zh-CN" sz="2000" smtClean="0"/>
+              <a:rPr lang="en-US" altLang="zh-CN" sz="2000"/>
               <a:t>----</a:t>
             </a:r>
             <a:r>
-              <a:rPr lang="zh-CN" altLang="en-US" sz="2000" smtClean="0"/>
+              <a:rPr lang="zh-CN" altLang="en-US" sz="2000"/>
               <a:t>与之前不同，比对结果要看以下目录的对应</a:t>
             </a:r>
             <a:r>
-              <a:rPr lang="en-US" altLang="zh-CN" sz="2000" smtClean="0"/>
+              <a:rPr lang="en-US" altLang="zh-CN" sz="2000"/>
               <a:t>output</a:t>
             </a:r>
             <a:r>
-              <a:rPr lang="zh-CN" altLang="en-US" sz="2000" smtClean="0"/>
+              <a:rPr lang="zh-CN" altLang="en-US" sz="2000"/>
               <a:t>后缀文件</a:t>
             </a:r>
-            <a:endParaRPr lang="en-US" altLang="zh-CN" sz="2000" smtClean="0"/>
-          </a:p>
-          <a:p>
-            <a:r>
-              <a:rPr lang="zh-CN" altLang="en-US" smtClean="0"/>
+            <a:endParaRPr lang="en-US" altLang="zh-CN" sz="2000"/>
+          </a:p>
+          <a:p>
+            <a:r>
+              <a:rPr lang="zh-CN" altLang="en-US"/>
               <a:t>如：</a:t>
             </a:r>
-            <a:endParaRPr lang="en-US" altLang="zh-CN" smtClean="0"/>
-          </a:p>
-          <a:p>
-            <a:endParaRPr lang="zh-CN" altLang="en-US" smtClean="0"/>
+            <a:endParaRPr lang="en-US" altLang="zh-CN"/>
+          </a:p>
+          <a:p>
+            <a:endParaRPr lang="zh-CN" altLang="en-US"/>
           </a:p>
         </p:txBody>
       </p:sp>
@@ -9726,13 +9634,6 @@
   <p:clrMapOvr>
     <a:masterClrMapping/>
   </p:clrMapOvr>
-  <p:timing>
-    <p:tnLst>
-      <p:par>
-        <p:cTn id="1" dur="indefinite" restart="never" nodeType="tmRoot"/>
-      </p:par>
-    </p:tnLst>
-  </p:timing>
 </p:sld>
 </file>
 
@@ -9772,14 +9673,13 @@
               <a:defRPr/>
             </a:pPr>
             <a:r>
-              <a:rPr lang="en-US" altLang="zh-CN" dirty="0" smtClean="0"/>
+              <a:rPr lang="en-US" altLang="zh-CN" dirty="0"/>
               <a:t>Project 2 </a:t>
             </a:r>
             <a:r>
-              <a:rPr lang="zh-CN" altLang="en-US" dirty="0" smtClean="0"/>
+              <a:rPr lang="zh-CN" altLang="en-US" dirty="0"/>
               <a:t>结果</a:t>
             </a:r>
-            <a:endParaRPr lang="zh-CN" altLang="en-US" dirty="0"/>
           </a:p>
         </p:txBody>
       </p:sp>
@@ -9802,18 +9702,18 @@
               <a:defRPr/>
             </a:pPr>
             <a:r>
-              <a:rPr lang="zh-CN" altLang="en-US" dirty="0" smtClean="0"/>
+              <a:rPr lang="zh-CN" altLang="en-US" dirty="0"/>
               <a:t>通过在</a:t>
             </a:r>
             <a:r>
-              <a:rPr lang="en-US" altLang="zh-CN" dirty="0" err="1" smtClean="0"/>
+              <a:rPr lang="en-US" altLang="zh-CN" dirty="0" err="1"/>
               <a:t>userprog</a:t>
             </a:r>
             <a:r>
-              <a:rPr lang="zh-CN" altLang="en-US" dirty="0" smtClean="0"/>
+              <a:rPr lang="zh-CN" altLang="en-US" dirty="0"/>
               <a:t>文件夹内</a:t>
             </a:r>
-            <a:endParaRPr lang="en-US" altLang="zh-CN" dirty="0" smtClean="0"/>
+            <a:endParaRPr lang="en-US" altLang="zh-CN" dirty="0"/>
           </a:p>
           <a:p>
             <a:pPr marL="0" indent="0">
@@ -9822,14 +9722,14 @@
               <a:defRPr/>
             </a:pPr>
             <a:r>
-              <a:rPr lang="en-US" altLang="zh-CN" dirty="0" smtClean="0"/>
+              <a:rPr lang="en-US" altLang="zh-CN" dirty="0"/>
               <a:t>	builds</a:t>
             </a:r>
             <a:r>
-              <a:rPr lang="zh-CN" altLang="en-US" dirty="0" smtClean="0"/>
+              <a:rPr lang="zh-CN" altLang="en-US" dirty="0"/>
               <a:t>文件下执行</a:t>
             </a:r>
-            <a:endParaRPr lang="en-US" altLang="zh-CN" dirty="0" smtClean="0"/>
+            <a:endParaRPr lang="en-US" altLang="zh-CN" dirty="0"/>
           </a:p>
           <a:p>
             <a:pPr marL="0" indent="0">
@@ -9838,11 +9738,11 @@
               <a:defRPr/>
             </a:pPr>
             <a:r>
-              <a:rPr lang="en-US" altLang="zh-CN" dirty="0" smtClean="0"/>
+              <a:rPr lang="en-US" altLang="zh-CN" dirty="0"/>
               <a:t>	</a:t>
             </a:r>
             <a:r>
-              <a:rPr lang="en-US" altLang="zh-CN" sz="2000" dirty="0" smtClean="0">
+              <a:rPr lang="en-US" altLang="zh-CN" sz="2000" dirty="0">
                 <a:solidFill>
                   <a:srgbClr val="FF0000"/>
                 </a:solidFill>
@@ -9850,7 +9750,7 @@
               <a:t>make SIMULATOR=--</a:t>
             </a:r>
             <a:r>
-              <a:rPr lang="en-US" altLang="zh-CN" sz="2000" dirty="0" err="1" smtClean="0">
+              <a:rPr lang="en-US" altLang="zh-CN" sz="2000" dirty="0" err="1">
                 <a:solidFill>
                   <a:srgbClr val="FF0000"/>
                 </a:solidFill>
@@ -9858,7 +9758,7 @@
               <a:t>bochs</a:t>
             </a:r>
             <a:r>
-              <a:rPr lang="en-US" altLang="zh-CN" sz="2000" dirty="0" smtClean="0">
+              <a:rPr lang="en-US" altLang="zh-CN" sz="2000" dirty="0">
                 <a:solidFill>
                   <a:srgbClr val="FF0000"/>
                 </a:solidFill>
@@ -9873,14 +9773,14 @@
               <a:defRPr/>
             </a:pPr>
             <a:r>
-              <a:rPr lang="en-US" altLang="zh-CN" sz="1800" dirty="0" smtClean="0"/>
+              <a:rPr lang="en-US" altLang="zh-CN" sz="1800" dirty="0"/>
               <a:t>	</a:t>
             </a:r>
             <a:r>
-              <a:rPr lang="zh-CN" altLang="en-US" dirty="0" smtClean="0"/>
+              <a:rPr lang="zh-CN" altLang="en-US" dirty="0"/>
               <a:t>进行整体结果检查</a:t>
             </a:r>
-            <a:endParaRPr lang="en-US" altLang="zh-CN" dirty="0" smtClean="0"/>
+            <a:endParaRPr lang="en-US" altLang="zh-CN" dirty="0"/>
           </a:p>
           <a:p>
             <a:pPr marL="0" indent="0">
@@ -9888,17 +9788,17 @@
               <a:buNone/>
               <a:defRPr/>
             </a:pPr>
-            <a:endParaRPr lang="en-US" altLang="zh-CN" dirty="0" smtClean="0"/>
+            <a:endParaRPr lang="en-US" altLang="zh-CN" dirty="0"/>
           </a:p>
           <a:p>
             <a:pPr>
               <a:defRPr/>
             </a:pPr>
             <a:r>
-              <a:rPr lang="zh-CN" altLang="en-US" dirty="0" smtClean="0"/>
+              <a:rPr lang="zh-CN" altLang="en-US" dirty="0"/>
               <a:t>结果应如右图</a:t>
             </a:r>
-            <a:endParaRPr lang="en-US" altLang="zh-CN" dirty="0" smtClean="0"/>
+            <a:endParaRPr lang="en-US" altLang="zh-CN" dirty="0"/>
           </a:p>
           <a:p>
             <a:pPr>
@@ -9945,13 +9845,6 @@
   <p:clrMapOvr>
     <a:masterClrMapping/>
   </p:clrMapOvr>
-  <p:timing>
-    <p:tnLst>
-      <p:par>
-        <p:cTn id="1" dur="indefinite" restart="never" nodeType="tmRoot"/>
-      </p:par>
-    </p:tnLst>
-  </p:timing>
 </p:sld>
 </file>
 
@@ -9991,10 +9884,9 @@
               <a:defRPr/>
             </a:pPr>
             <a:r>
-              <a:rPr lang="zh-CN" altLang="en-US" dirty="0" smtClean="0"/>
+              <a:rPr lang="zh-CN" altLang="en-US" dirty="0"/>
               <a:t>单个测试结果举例说明</a:t>
             </a:r>
-            <a:endParaRPr lang="zh-CN" altLang="en-US" dirty="0"/>
           </a:p>
         </p:txBody>
       </p:sp>
@@ -10027,26 +9919,26 @@
               </a:spcAft>
             </a:pPr>
             <a:r>
-              <a:rPr lang="zh-CN" altLang="en-US" sz="2400" smtClean="0"/>
+              <a:rPr lang="zh-CN" altLang="en-US" sz="2400"/>
               <a:t>参数传递</a:t>
             </a:r>
             <a:r>
-              <a:rPr lang="en-US" altLang="zh-CN" sz="2400" smtClean="0"/>
+              <a:rPr lang="en-US" altLang="zh-CN" sz="2400"/>
               <a:t>----</a:t>
             </a:r>
             <a:r>
-              <a:rPr lang="zh-CN" altLang="en-US" sz="2400" smtClean="0"/>
+              <a:rPr lang="zh-CN" altLang="en-US" sz="2400"/>
               <a:t>结果应该有参数输出，寻找要看以下目录的对应</a:t>
             </a:r>
             <a:r>
-              <a:rPr lang="en-US" altLang="zh-CN" sz="2400" smtClean="0"/>
+              <a:rPr lang="en-US" altLang="zh-CN" sz="2400"/>
               <a:t>output</a:t>
             </a:r>
             <a:r>
-              <a:rPr lang="zh-CN" altLang="en-US" sz="2400" smtClean="0"/>
+              <a:rPr lang="zh-CN" altLang="en-US" sz="2400"/>
               <a:t>后缀文件</a:t>
             </a:r>
-            <a:endParaRPr lang="en-US" altLang="zh-CN" sz="2400" smtClean="0"/>
+            <a:endParaRPr lang="en-US" altLang="zh-CN" sz="2400"/>
           </a:p>
           <a:p>
             <a:pPr>
@@ -10058,10 +9950,10 @@
               </a:spcAft>
             </a:pPr>
             <a:r>
-              <a:rPr lang="zh-CN" altLang="en-US" sz="2400" smtClean="0"/>
+              <a:rPr lang="zh-CN" altLang="en-US" sz="2400"/>
               <a:t>如：</a:t>
             </a:r>
-            <a:endParaRPr lang="en-US" altLang="zh-CN" sz="2400" smtClean="0"/>
+            <a:endParaRPr lang="en-US" altLang="zh-CN" sz="2400"/>
           </a:p>
           <a:p>
             <a:pPr>
@@ -10072,7 +9964,7 @@
                 <a:spcPct val="0"/>
               </a:spcAft>
             </a:pPr>
-            <a:endParaRPr lang="zh-CN" altLang="en-US" sz="2400" smtClean="0"/>
+            <a:endParaRPr lang="zh-CN" altLang="en-US" sz="2400"/>
           </a:p>
         </p:txBody>
       </p:sp>
@@ -10284,13 +10176,6 @@
   <p:clrMapOvr>
     <a:masterClrMapping/>
   </p:clrMapOvr>
-  <p:timing>
-    <p:tnLst>
-      <p:par>
-        <p:cTn id="1" dur="indefinite" restart="never" nodeType="tmRoot"/>
-      </p:par>
-    </p:tnLst>
-  </p:timing>
 </p:sld>
 </file>
 
@@ -10330,10 +10215,9 @@
               <a:defRPr/>
             </a:pPr>
             <a:r>
-              <a:rPr lang="zh-CN" altLang="en-US" dirty="0" smtClean="0"/>
+              <a:rPr lang="zh-CN" altLang="en-US" dirty="0"/>
               <a:t>单个测试结果举例说明</a:t>
             </a:r>
-            <a:endParaRPr lang="zh-CN" altLang="en-US" dirty="0"/>
           </a:p>
         </p:txBody>
       </p:sp>
@@ -10366,34 +10250,34 @@
               </a:spcAft>
             </a:pPr>
             <a:r>
-              <a:rPr lang="zh-CN" altLang="en-US" sz="2400" smtClean="0"/>
+              <a:rPr lang="zh-CN" altLang="en-US" sz="2400"/>
               <a:t>系统调用</a:t>
             </a:r>
             <a:r>
-              <a:rPr lang="en-US" altLang="zh-CN" sz="2400" smtClean="0"/>
+              <a:rPr lang="en-US" altLang="zh-CN" sz="2400"/>
               <a:t>----</a:t>
             </a:r>
             <a:r>
-              <a:rPr lang="zh-CN" altLang="en-US" sz="2400" smtClean="0"/>
+              <a:rPr lang="zh-CN" altLang="en-US" sz="2400"/>
               <a:t>调用</a:t>
             </a:r>
             <a:r>
-              <a:rPr lang="en-US" altLang="zh-CN" sz="2400" smtClean="0"/>
+              <a:rPr lang="en-US" altLang="zh-CN" sz="2400"/>
               <a:t>open/write</a:t>
             </a:r>
             <a:r>
-              <a:rPr lang="zh-CN" altLang="en-US" sz="2400" smtClean="0"/>
+              <a:rPr lang="zh-CN" altLang="en-US" sz="2400"/>
               <a:t>等函数，同看以下目录的对应</a:t>
             </a:r>
             <a:r>
-              <a:rPr lang="en-US" altLang="zh-CN" sz="2400" smtClean="0"/>
+              <a:rPr lang="en-US" altLang="zh-CN" sz="2400"/>
               <a:t>output</a:t>
             </a:r>
             <a:r>
-              <a:rPr lang="zh-CN" altLang="en-US" sz="2400" smtClean="0"/>
+              <a:rPr lang="zh-CN" altLang="en-US" sz="2400"/>
               <a:t>后缀文件</a:t>
             </a:r>
-            <a:endParaRPr lang="en-US" altLang="zh-CN" sz="2400" smtClean="0"/>
+            <a:endParaRPr lang="en-US" altLang="zh-CN" sz="2400"/>
           </a:p>
           <a:p>
             <a:pPr>
@@ -10405,22 +10289,22 @@
               </a:spcAft>
             </a:pPr>
             <a:r>
-              <a:rPr lang="zh-CN" altLang="en-US" sz="2400" smtClean="0"/>
+              <a:rPr lang="zh-CN" altLang="en-US" sz="2400"/>
               <a:t>如：                                                                                        （调用</a:t>
             </a:r>
             <a:r>
-              <a:rPr lang="en-US" altLang="zh-CN" sz="2400" smtClean="0"/>
+              <a:rPr lang="en-US" altLang="zh-CN" sz="2400"/>
               <a:t>open</a:t>
             </a:r>
             <a:r>
-              <a:rPr lang="zh-CN" altLang="en-US" sz="2400" smtClean="0"/>
+              <a:rPr lang="zh-CN" altLang="en-US" sz="2400"/>
               <a:t>命令）</a:t>
             </a:r>
-            <a:endParaRPr lang="en-US" altLang="zh-CN" sz="2400" smtClean="0"/>
+            <a:endParaRPr lang="en-US" altLang="zh-CN" sz="2400"/>
           </a:p>
           <a:p>
             <a:pPr marL="742950" lvl="1" indent="-285750"/>
-            <a:endParaRPr lang="zh-CN" altLang="en-US" sz="2200" smtClean="0"/>
+            <a:endParaRPr lang="zh-CN" altLang="en-US" sz="2200"/>
           </a:p>
         </p:txBody>
       </p:sp>
@@ -10579,13 +10463,6 @@
   <p:clrMapOvr>
     <a:masterClrMapping/>
   </p:clrMapOvr>
-  <p:timing>
-    <p:tnLst>
-      <p:par>
-        <p:cTn id="1" dur="indefinite" restart="never" nodeType="tmRoot"/>
-      </p:par>
-    </p:tnLst>
-  </p:timing>
 </p:sld>
 </file>
 
@@ -10802,14 +10679,14 @@
         <a:effectLst/>
         <a:extLst>
           <a:ext uri="{909E8E84-426E-40DD-AFC4-6F175D3DCCD1}">
-            <a14:hiddenFill xmlns="" xmlns:a14="http://schemas.microsoft.com/office/drawing/2010/main">
+            <a14:hiddenFill xmlns:a14="http://schemas.microsoft.com/office/drawing/2010/main">
               <a:solidFill>
                 <a:schemeClr val="accent1"/>
               </a:solidFill>
             </a14:hiddenFill>
           </a:ext>
           <a:ext uri="{91240B29-F687-4F45-9708-019B960494DF}">
-            <a14:hiddenLine xmlns="" xmlns:a14="http://schemas.microsoft.com/office/drawing/2010/main" w="9525" cap="flat" cmpd="sng" algn="ctr">
+            <a14:hiddenLine xmlns:a14="http://schemas.microsoft.com/office/drawing/2010/main" w="9525" cap="flat" cmpd="sng" algn="ctr">
               <a:solidFill>
                 <a:schemeClr val="tx1"/>
               </a:solidFill>
@@ -10820,7 +10697,7 @@
             </a14:hiddenLine>
           </a:ext>
           <a:ext uri="{AF507438-7753-43E0-B8FC-AC1667EBCBE1}">
-            <a14:hiddenEffects xmlns="" xmlns:a14="http://schemas.microsoft.com/office/drawing/2010/main">
+            <a14:hiddenEffects xmlns:a14="http://schemas.microsoft.com/office/drawing/2010/main">
               <a:effectLst>
                 <a:outerShdw dist="35921" dir="2700000" algn="ctr" rotWithShape="0">
                   <a:schemeClr val="bg2"/>
@@ -10888,14 +10765,14 @@
         <a:effectLst/>
         <a:extLst>
           <a:ext uri="{909E8E84-426E-40DD-AFC4-6F175D3DCCD1}">
-            <a14:hiddenFill xmlns="" xmlns:a14="http://schemas.microsoft.com/office/drawing/2010/main">
+            <a14:hiddenFill xmlns:a14="http://schemas.microsoft.com/office/drawing/2010/main">
               <a:solidFill>
                 <a:schemeClr val="accent1"/>
               </a:solidFill>
             </a14:hiddenFill>
           </a:ext>
           <a:ext uri="{91240B29-F687-4F45-9708-019B960494DF}">
-            <a14:hiddenLine xmlns="" xmlns:a14="http://schemas.microsoft.com/office/drawing/2010/main" w="9525" cap="flat" cmpd="sng" algn="ctr">
+            <a14:hiddenLine xmlns:a14="http://schemas.microsoft.com/office/drawing/2010/main" w="9525" cap="flat" cmpd="sng" algn="ctr">
               <a:solidFill>
                 <a:schemeClr val="tx1"/>
               </a:solidFill>
@@ -10906,7 +10783,7 @@
             </a14:hiddenLine>
           </a:ext>
           <a:ext uri="{AF507438-7753-43E0-B8FC-AC1667EBCBE1}">
-            <a14:hiddenEffects xmlns="" xmlns:a14="http://schemas.microsoft.com/office/drawing/2010/main">
+            <a14:hiddenEffects xmlns:a14="http://schemas.microsoft.com/office/drawing/2010/main">
               <a:effectLst>
                 <a:outerShdw dist="35921" dir="2700000" algn="ctr" rotWithShape="0">
                   <a:schemeClr val="bg2"/>
@@ -11327,7 +11204,7 @@
   </a:extraClrSchemeLst>
   <a:extLst>
     <a:ext uri="{05A4C25C-085E-4340-85A3-A5531E510DB2}">
-      <thm15:themeFamily xmlns="" xmlns:thm15="http://schemas.microsoft.com/office/thememl/2012/main" name="主题1" id="{C37849A2-D056-436E-A212-3E0606182624}" vid="{3AD13782-9C3C-4008-88F0-F2604F20E173}"/>
+      <thm15:themeFamily xmlns:thm15="http://schemas.microsoft.com/office/thememl/2012/main" name="主题1" id="{C37849A2-D056-436E-A212-3E0606182624}" vid="{3AD13782-9C3C-4008-88F0-F2604F20E173}"/>
     </a:ext>
   </a:extLst>
 </a:theme>
@@ -11546,14 +11423,14 @@
         <a:effectLst/>
         <a:extLst>
           <a:ext uri="{909E8E84-426E-40DD-AFC4-6F175D3DCCD1}">
-            <a14:hiddenFill xmlns="" xmlns:a14="http://schemas.microsoft.com/office/drawing/2010/main">
+            <a14:hiddenFill xmlns:a14="http://schemas.microsoft.com/office/drawing/2010/main">
               <a:solidFill>
                 <a:schemeClr val="accent1"/>
               </a:solidFill>
             </a14:hiddenFill>
           </a:ext>
           <a:ext uri="{91240B29-F687-4F45-9708-019B960494DF}">
-            <a14:hiddenLine xmlns="" xmlns:a14="http://schemas.microsoft.com/office/drawing/2010/main" w="9525" cap="flat" cmpd="sng" algn="ctr">
+            <a14:hiddenLine xmlns:a14="http://schemas.microsoft.com/office/drawing/2010/main" w="9525" cap="flat" cmpd="sng" algn="ctr">
               <a:solidFill>
                 <a:schemeClr val="tx1"/>
               </a:solidFill>
@@ -11564,7 +11441,7 @@
             </a14:hiddenLine>
           </a:ext>
           <a:ext uri="{AF507438-7753-43E0-B8FC-AC1667EBCBE1}">
-            <a14:hiddenEffects xmlns="" xmlns:a14="http://schemas.microsoft.com/office/drawing/2010/main">
+            <a14:hiddenEffects xmlns:a14="http://schemas.microsoft.com/office/drawing/2010/main">
               <a:effectLst>
                 <a:outerShdw dist="35921" dir="2700000" algn="ctr" rotWithShape="0">
                   <a:schemeClr val="bg2"/>
@@ -11632,14 +11509,14 @@
         <a:effectLst/>
         <a:extLst>
           <a:ext uri="{909E8E84-426E-40DD-AFC4-6F175D3DCCD1}">
-            <a14:hiddenFill xmlns="" xmlns:a14="http://schemas.microsoft.com/office/drawing/2010/main">
+            <a14:hiddenFill xmlns:a14="http://schemas.microsoft.com/office/drawing/2010/main">
               <a:solidFill>
                 <a:schemeClr val="accent1"/>
               </a:solidFill>
             </a14:hiddenFill>
           </a:ext>
           <a:ext uri="{91240B29-F687-4F45-9708-019B960494DF}">
-            <a14:hiddenLine xmlns="" xmlns:a14="http://schemas.microsoft.com/office/drawing/2010/main" w="9525" cap="flat" cmpd="sng" algn="ctr">
+            <a14:hiddenLine xmlns:a14="http://schemas.microsoft.com/office/drawing/2010/main" w="9525" cap="flat" cmpd="sng" algn="ctr">
               <a:solidFill>
                 <a:schemeClr val="tx1"/>
               </a:solidFill>
@@ -11650,7 +11527,7 @@
             </a14:hiddenLine>
           </a:ext>
           <a:ext uri="{AF507438-7753-43E0-B8FC-AC1667EBCBE1}">
-            <a14:hiddenEffects xmlns="" xmlns:a14="http://schemas.microsoft.com/office/drawing/2010/main">
+            <a14:hiddenEffects xmlns:a14="http://schemas.microsoft.com/office/drawing/2010/main">
               <a:effectLst>
                 <a:outerShdw dist="35921" dir="2700000" algn="ctr" rotWithShape="0">
                   <a:schemeClr val="bg2"/>
@@ -12194,7 +12071,7 @@
   </a:extraClrSchemeLst>
   <a:extLst>
     <a:ext uri="{05A4C25C-085E-4340-85A3-A5531E510DB2}">
-      <thm15:themeFamily xmlns="" xmlns:thm15="http://schemas.microsoft.com/office/thememl/2012/main" name="Office Theme" id="{62F939B6-93AF-4DB8-9C6B-D6C7DFDC589F}" vid="{4A3C46E8-61CC-4603-A589-7422A47A8E4A}"/>
+      <thm15:themeFamily xmlns:thm15="http://schemas.microsoft.com/office/thememl/2012/main" name="Office Theme" id="{62F939B6-93AF-4DB8-9C6B-D6C7DFDC589F}" vid="{4A3C46E8-61CC-4603-A589-7422A47A8E4A}"/>
     </a:ext>
   </a:extLst>
 </a:theme>
@@ -12455,7 +12332,7 @@
   <a:extraClrSchemeLst/>
   <a:extLst>
     <a:ext uri="{05A4C25C-085E-4340-85A3-A5531E510DB2}">
-      <thm15:themeFamily xmlns="" xmlns:thm15="http://schemas.microsoft.com/office/thememl/2012/main" name="Office Theme" id="{62F939B6-93AF-4DB8-9C6B-D6C7DFDC589F}" vid="{4A3C46E8-61CC-4603-A589-7422A47A8E4A}"/>
+      <thm15:themeFamily xmlns:thm15="http://schemas.microsoft.com/office/thememl/2012/main" name="Office Theme" id="{62F939B6-93AF-4DB8-9C6B-D6C7DFDC589F}" vid="{4A3C46E8-61CC-4603-A589-7422A47A8E4A}"/>
     </a:ext>
   </a:extLst>
 </a:theme>

</xml_diff>